<commit_message>
FHIR-46155 Reviewed index.md, guidance.md, and datax.md to remove language that assumes dependence on QI-Core, US Core, and QMIG FHIR-43586 Updated Must Support guidance in guidance.md
</commit_message>
<xml_diff>
--- a/input/images/source/DEQM IG Diagram.pptx
+++ b/input/images/source/DEQM IG Diagram.pptx
@@ -261,7 +261,7 @@
           <a:p>
             <a:fld id="{A1C33FE8-8021-45D4-B0C5-0B5FC73F013B}" type="datetimeFigureOut">
               <a:rPr lang="en-US" smtClean="0"/>
-              <a:t>3/12/2019</a:t>
+              <a:t>6/26/2024</a:t>
             </a:fld>
             <a:endParaRPr lang="en-US"/>
           </a:p>
@@ -459,7 +459,7 @@
           <a:p>
             <a:fld id="{A1C33FE8-8021-45D4-B0C5-0B5FC73F013B}" type="datetimeFigureOut">
               <a:rPr lang="en-US" smtClean="0"/>
-              <a:t>3/12/2019</a:t>
+              <a:t>6/26/2024</a:t>
             </a:fld>
             <a:endParaRPr lang="en-US"/>
           </a:p>
@@ -667,7 +667,7 @@
           <a:p>
             <a:fld id="{A1C33FE8-8021-45D4-B0C5-0B5FC73F013B}" type="datetimeFigureOut">
               <a:rPr lang="en-US" smtClean="0"/>
-              <a:t>3/12/2019</a:t>
+              <a:t>6/26/2024</a:t>
             </a:fld>
             <a:endParaRPr lang="en-US"/>
           </a:p>
@@ -865,7 +865,7 @@
           <a:p>
             <a:fld id="{A1C33FE8-8021-45D4-B0C5-0B5FC73F013B}" type="datetimeFigureOut">
               <a:rPr lang="en-US" smtClean="0"/>
-              <a:t>3/12/2019</a:t>
+              <a:t>6/26/2024</a:t>
             </a:fld>
             <a:endParaRPr lang="en-US"/>
           </a:p>
@@ -1140,7 +1140,7 @@
           <a:p>
             <a:fld id="{A1C33FE8-8021-45D4-B0C5-0B5FC73F013B}" type="datetimeFigureOut">
               <a:rPr lang="en-US" smtClean="0"/>
-              <a:t>3/12/2019</a:t>
+              <a:t>6/26/2024</a:t>
             </a:fld>
             <a:endParaRPr lang="en-US"/>
           </a:p>
@@ -1405,7 +1405,7 @@
           <a:p>
             <a:fld id="{A1C33FE8-8021-45D4-B0C5-0B5FC73F013B}" type="datetimeFigureOut">
               <a:rPr lang="en-US" smtClean="0"/>
-              <a:t>3/12/2019</a:t>
+              <a:t>6/26/2024</a:t>
             </a:fld>
             <a:endParaRPr lang="en-US"/>
           </a:p>
@@ -1817,7 +1817,7 @@
           <a:p>
             <a:fld id="{A1C33FE8-8021-45D4-B0C5-0B5FC73F013B}" type="datetimeFigureOut">
               <a:rPr lang="en-US" smtClean="0"/>
-              <a:t>3/12/2019</a:t>
+              <a:t>6/26/2024</a:t>
             </a:fld>
             <a:endParaRPr lang="en-US"/>
           </a:p>
@@ -1958,7 +1958,7 @@
           <a:p>
             <a:fld id="{A1C33FE8-8021-45D4-B0C5-0B5FC73F013B}" type="datetimeFigureOut">
               <a:rPr lang="en-US" smtClean="0"/>
-              <a:t>3/12/2019</a:t>
+              <a:t>6/26/2024</a:t>
             </a:fld>
             <a:endParaRPr lang="en-US"/>
           </a:p>
@@ -2071,7 +2071,7 @@
           <a:p>
             <a:fld id="{A1C33FE8-8021-45D4-B0C5-0B5FC73F013B}" type="datetimeFigureOut">
               <a:rPr lang="en-US" smtClean="0"/>
-              <a:t>3/12/2019</a:t>
+              <a:t>6/26/2024</a:t>
             </a:fld>
             <a:endParaRPr lang="en-US"/>
           </a:p>
@@ -2382,7 +2382,7 @@
           <a:p>
             <a:fld id="{A1C33FE8-8021-45D4-B0C5-0B5FC73F013B}" type="datetimeFigureOut">
               <a:rPr lang="en-US" smtClean="0"/>
-              <a:t>3/12/2019</a:t>
+              <a:t>6/26/2024</a:t>
             </a:fld>
             <a:endParaRPr lang="en-US"/>
           </a:p>
@@ -2670,7 +2670,7 @@
           <a:p>
             <a:fld id="{A1C33FE8-8021-45D4-B0C5-0B5FC73F013B}" type="datetimeFigureOut">
               <a:rPr lang="en-US" smtClean="0"/>
-              <a:t>3/12/2019</a:t>
+              <a:t>6/26/2024</a:t>
             </a:fld>
             <a:endParaRPr lang="en-US"/>
           </a:p>
@@ -2911,7 +2911,7 @@
           <a:p>
             <a:fld id="{A1C33FE8-8021-45D4-B0C5-0B5FC73F013B}" type="datetimeFigureOut">
               <a:rPr lang="en-US" smtClean="0"/>
-              <a:t>3/12/2019</a:t>
+              <a:t>6/26/2024</a:t>
             </a:fld>
             <a:endParaRPr lang="en-US"/>
           </a:p>
@@ -5619,11 +5619,14 @@
             <a:lstStyle/>
             <a:p>
               <a:r>
-                <a:rPr lang="en-US" sz="1600" dirty="0">
+                <a:rPr lang="en-US" sz="1600">
                   <a:latin typeface="Courier" pitchFamily="2" charset="0"/>
                 </a:rPr>
-                <a:t>patient-list</a:t>
+                <a:t>subject list</a:t>
               </a:r>
+              <a:endParaRPr lang="en-US" sz="1600" dirty="0">
+                <a:latin typeface="Courier" pitchFamily="2" charset="0"/>
+              </a:endParaRPr>
             </a:p>
           </p:txBody>
         </p:sp>
@@ -5677,8 +5680,8 @@
         </p:nvGrpSpPr>
         <p:grpSpPr>
           <a:xfrm>
-            <a:off x="2707669" y="4207298"/>
-            <a:ext cx="2124808" cy="664084"/>
+            <a:off x="2770211" y="4205845"/>
+            <a:ext cx="1999724" cy="664084"/>
             <a:chOff x="2862110" y="2885008"/>
             <a:chExt cx="2247060" cy="583024"/>
           </a:xfrm>
@@ -5754,8 +5757,8 @@
           </p:nvSpPr>
           <p:spPr>
             <a:xfrm>
-              <a:off x="2921276" y="3024531"/>
-              <a:ext cx="2153285" cy="297229"/>
+              <a:off x="2921277" y="3024531"/>
+              <a:ext cx="1892219" cy="297229"/>
             </a:xfrm>
             <a:prstGeom prst="rect">
               <a:avLst/>
@@ -5772,7 +5775,7 @@
                 <a:rPr lang="en-US" sz="1600" dirty="0">
                   <a:latin typeface="Courier" pitchFamily="2" charset="0"/>
                 </a:rPr>
-                <a:t>data-collection</a:t>
+                <a:t>data exchange</a:t>
               </a:r>
             </a:p>
           </p:txBody>

</xml_diff>

<commit_message>
[FHIR-49635](https://jira.hl7.org/browse/FHIR-49635): Moved Background and Glossary to separate pages and expanded on reporting scenarios
</commit_message>
<xml_diff>
--- a/input/images/source/DEQM IG Diagram.pptx
+++ b/input/images/source/DEQM IG Diagram.pptx
@@ -8,6 +8,10 @@
     <p:sldId id="261" r:id="rId2"/>
     <p:sldId id="259" r:id="rId3"/>
     <p:sldId id="260" r:id="rId4"/>
+    <p:sldId id="4860" r:id="rId5"/>
+    <p:sldId id="4863" r:id="rId6"/>
+    <p:sldId id="4864" r:id="rId7"/>
+    <p:sldId id="4865" r:id="rId8"/>
   </p:sldIdLst>
   <p:sldSz cx="12192000" cy="6858000"/>
   <p:notesSz cx="6858000" cy="9144000"/>
@@ -261,7 +265,7 @@
           <a:p>
             <a:fld id="{A1C33FE8-8021-45D4-B0C5-0B5FC73F013B}" type="datetimeFigureOut">
               <a:rPr lang="en-US" smtClean="0"/>
-              <a:t>3/12/2019</a:t>
+              <a:t>4/8/2025</a:t>
             </a:fld>
             <a:endParaRPr lang="en-US"/>
           </a:p>
@@ -459,7 +463,7 @@
           <a:p>
             <a:fld id="{A1C33FE8-8021-45D4-B0C5-0B5FC73F013B}" type="datetimeFigureOut">
               <a:rPr lang="en-US" smtClean="0"/>
-              <a:t>3/12/2019</a:t>
+              <a:t>4/8/2025</a:t>
             </a:fld>
             <a:endParaRPr lang="en-US"/>
           </a:p>
@@ -667,7 +671,7 @@
           <a:p>
             <a:fld id="{A1C33FE8-8021-45D4-B0C5-0B5FC73F013B}" type="datetimeFigureOut">
               <a:rPr lang="en-US" smtClean="0"/>
-              <a:t>3/12/2019</a:t>
+              <a:t>4/8/2025</a:t>
             </a:fld>
             <a:endParaRPr lang="en-US"/>
           </a:p>
@@ -731,6 +735,952 @@
     <p:extLst>
       <p:ext uri="{BB962C8B-B14F-4D97-AF65-F5344CB8AC3E}">
         <p14:creationId xmlns:p14="http://schemas.microsoft.com/office/powerpoint/2010/main" val="546222985"/>
+      </p:ext>
+    </p:extLst>
+  </p:cSld>
+  <p:clrMapOvr>
+    <a:masterClrMapping/>
+  </p:clrMapOvr>
+</p:sldLayout>
+</file>
+
+<file path=ppt/slideLayouts/slideLayout12.xml><?xml version="1.0" encoding="utf-8"?>
+<p:sldLayout xmlns:a="http://schemas.openxmlformats.org/drawingml/2006/main" xmlns:r="http://schemas.openxmlformats.org/officeDocument/2006/relationships" xmlns:p="http://schemas.openxmlformats.org/presentationml/2006/main" matchingName="1-Column Text">
+  <p:cSld name="1-Column Text">
+    <p:spTree>
+      <p:nvGrpSpPr>
+        <p:cNvPr id="1" name="Shape 36"/>
+        <p:cNvGrpSpPr/>
+        <p:nvPr/>
+      </p:nvGrpSpPr>
+      <p:grpSpPr>
+        <a:xfrm>
+          <a:off x="0" y="0"/>
+          <a:ext cx="0" cy="0"/>
+          <a:chOff x="0" y="0"/>
+          <a:chExt cx="0" cy="0"/>
+        </a:xfrm>
+      </p:grpSpPr>
+      <p:cxnSp>
+        <p:nvCxnSpPr>
+          <p:cNvPr id="37" name="Google Shape;37;p14"/>
+          <p:cNvCxnSpPr/>
+          <p:nvPr/>
+        </p:nvCxnSpPr>
+        <p:spPr>
+          <a:xfrm>
+            <a:off x="609600" y="275167"/>
+            <a:ext cx="0" cy="1043517"/>
+          </a:xfrm>
+          <a:prstGeom prst="straightConnector1">
+            <a:avLst/>
+          </a:prstGeom>
+          <a:noFill/>
+          <a:ln w="41275" cap="flat" cmpd="sng">
+            <a:solidFill>
+              <a:srgbClr val="000000"/>
+            </a:solidFill>
+            <a:prstDash val="solid"/>
+            <a:round/>
+            <a:headEnd type="none" w="sm" len="sm"/>
+            <a:tailEnd type="none" w="sm" len="sm"/>
+          </a:ln>
+        </p:spPr>
+      </p:cxnSp>
+      <p:sp>
+        <p:nvSpPr>
+          <p:cNvPr id="38" name="Google Shape;38;p14"/>
+          <p:cNvSpPr txBox="1">
+            <a:spLocks noGrp="1"/>
+          </p:cNvSpPr>
+          <p:nvPr>
+            <p:ph type="title"/>
+          </p:nvPr>
+        </p:nvSpPr>
+        <p:spPr>
+          <a:xfrm>
+            <a:off x="818196" y="274639"/>
+            <a:ext cx="10972800" cy="1043103"/>
+          </a:xfrm>
+          <a:prstGeom prst="rect">
+            <a:avLst/>
+          </a:prstGeom>
+          <a:noFill/>
+          <a:ln>
+            <a:noFill/>
+          </a:ln>
+        </p:spPr>
+        <p:txBody>
+          <a:bodyPr spcFirstLastPara="1" wrap="square" lIns="0" tIns="0" rIns="0" bIns="0" anchor="ctr" anchorCtr="0">
+            <a:noAutofit/>
+          </a:bodyPr>
+          <a:lstStyle>
+            <a:lvl1pPr lvl="0" algn="l">
+              <a:lnSpc>
+                <a:spcPct val="100000"/>
+              </a:lnSpc>
+              <a:spcBef>
+                <a:spcPts val="0"/>
+              </a:spcBef>
+              <a:spcAft>
+                <a:spcPts val="0"/>
+              </a:spcAft>
+              <a:buSzPts val="1400"/>
+              <a:buNone/>
+              <a:defRPr sz="4000" b="1">
+                <a:solidFill>
+                  <a:srgbClr val="EC2227"/>
+                </a:solidFill>
+              </a:defRPr>
+            </a:lvl1pPr>
+            <a:lvl2pPr lvl="1" algn="ctr">
+              <a:lnSpc>
+                <a:spcPct val="100000"/>
+              </a:lnSpc>
+              <a:spcBef>
+                <a:spcPts val="0"/>
+              </a:spcBef>
+              <a:spcAft>
+                <a:spcPts val="0"/>
+              </a:spcAft>
+              <a:buSzPts val="1400"/>
+              <a:buNone/>
+              <a:defRPr/>
+            </a:lvl2pPr>
+            <a:lvl3pPr lvl="2" algn="ctr">
+              <a:lnSpc>
+                <a:spcPct val="100000"/>
+              </a:lnSpc>
+              <a:spcBef>
+                <a:spcPts val="0"/>
+              </a:spcBef>
+              <a:spcAft>
+                <a:spcPts val="0"/>
+              </a:spcAft>
+              <a:buSzPts val="1400"/>
+              <a:buNone/>
+              <a:defRPr/>
+            </a:lvl3pPr>
+            <a:lvl4pPr lvl="3" algn="ctr">
+              <a:lnSpc>
+                <a:spcPct val="100000"/>
+              </a:lnSpc>
+              <a:spcBef>
+                <a:spcPts val="0"/>
+              </a:spcBef>
+              <a:spcAft>
+                <a:spcPts val="0"/>
+              </a:spcAft>
+              <a:buSzPts val="1400"/>
+              <a:buNone/>
+              <a:defRPr/>
+            </a:lvl4pPr>
+            <a:lvl5pPr lvl="4" algn="ctr">
+              <a:lnSpc>
+                <a:spcPct val="100000"/>
+              </a:lnSpc>
+              <a:spcBef>
+                <a:spcPts val="0"/>
+              </a:spcBef>
+              <a:spcAft>
+                <a:spcPts val="0"/>
+              </a:spcAft>
+              <a:buSzPts val="1400"/>
+              <a:buNone/>
+              <a:defRPr/>
+            </a:lvl5pPr>
+            <a:lvl6pPr lvl="5" algn="ctr">
+              <a:lnSpc>
+                <a:spcPct val="100000"/>
+              </a:lnSpc>
+              <a:spcBef>
+                <a:spcPts val="0"/>
+              </a:spcBef>
+              <a:spcAft>
+                <a:spcPts val="0"/>
+              </a:spcAft>
+              <a:buSzPts val="1400"/>
+              <a:buNone/>
+              <a:defRPr/>
+            </a:lvl6pPr>
+            <a:lvl7pPr lvl="6" algn="ctr">
+              <a:lnSpc>
+                <a:spcPct val="100000"/>
+              </a:lnSpc>
+              <a:spcBef>
+                <a:spcPts val="0"/>
+              </a:spcBef>
+              <a:spcAft>
+                <a:spcPts val="0"/>
+              </a:spcAft>
+              <a:buSzPts val="1400"/>
+              <a:buNone/>
+              <a:defRPr/>
+            </a:lvl7pPr>
+            <a:lvl8pPr lvl="7" algn="ctr">
+              <a:lnSpc>
+                <a:spcPct val="100000"/>
+              </a:lnSpc>
+              <a:spcBef>
+                <a:spcPts val="0"/>
+              </a:spcBef>
+              <a:spcAft>
+                <a:spcPts val="0"/>
+              </a:spcAft>
+              <a:buSzPts val="1400"/>
+              <a:buNone/>
+              <a:defRPr/>
+            </a:lvl8pPr>
+            <a:lvl9pPr lvl="8" algn="ctr">
+              <a:lnSpc>
+                <a:spcPct val="100000"/>
+              </a:lnSpc>
+              <a:spcBef>
+                <a:spcPts val="0"/>
+              </a:spcBef>
+              <a:spcAft>
+                <a:spcPts val="0"/>
+              </a:spcAft>
+              <a:buSzPts val="1400"/>
+              <a:buNone/>
+              <a:defRPr/>
+            </a:lvl9pPr>
+          </a:lstStyle>
+          <a:p>
+            <a:endParaRPr/>
+          </a:p>
+        </p:txBody>
+      </p:sp>
+      <p:sp>
+        <p:nvSpPr>
+          <p:cNvPr id="39" name="Google Shape;39;p14"/>
+          <p:cNvSpPr txBox="1">
+            <a:spLocks noGrp="1"/>
+          </p:cNvSpPr>
+          <p:nvPr>
+            <p:ph type="body" idx="1"/>
+          </p:nvPr>
+        </p:nvSpPr>
+        <p:spPr>
+          <a:xfrm>
+            <a:off x="819150" y="1513192"/>
+            <a:ext cx="10971844" cy="4501401"/>
+          </a:xfrm>
+          <a:prstGeom prst="rect">
+            <a:avLst/>
+          </a:prstGeom>
+          <a:noFill/>
+          <a:ln>
+            <a:noFill/>
+          </a:ln>
+        </p:spPr>
+        <p:txBody>
+          <a:bodyPr spcFirstLastPara="1" wrap="square" lIns="0" tIns="0" rIns="0" bIns="0" anchor="t" anchorCtr="0">
+            <a:noAutofit/>
+          </a:bodyPr>
+          <a:lstStyle>
+            <a:lvl1pPr marL="609585" lvl="0" indent="-507987" algn="l">
+              <a:lnSpc>
+                <a:spcPct val="100000"/>
+              </a:lnSpc>
+              <a:spcBef>
+                <a:spcPts val="800"/>
+              </a:spcBef>
+              <a:spcAft>
+                <a:spcPts val="0"/>
+              </a:spcAft>
+              <a:buClr>
+                <a:schemeClr val="dk1"/>
+              </a:buClr>
+              <a:buSzPts val="2400"/>
+              <a:buChar char="•"/>
+              <a:defRPr sz="3200"/>
+            </a:lvl1pPr>
+            <a:lvl2pPr marL="1219170" lvl="1" indent="-474121" algn="l">
+              <a:lnSpc>
+                <a:spcPct val="100000"/>
+              </a:lnSpc>
+              <a:spcBef>
+                <a:spcPts val="800"/>
+              </a:spcBef>
+              <a:spcAft>
+                <a:spcPts val="0"/>
+              </a:spcAft>
+              <a:buClr>
+                <a:schemeClr val="dk1"/>
+              </a:buClr>
+              <a:buSzPts val="2000"/>
+              <a:buChar char="–"/>
+              <a:defRPr sz="2667"/>
+            </a:lvl2pPr>
+            <a:lvl3pPr marL="1828754" lvl="2" indent="-457189" algn="l">
+              <a:lnSpc>
+                <a:spcPct val="100000"/>
+              </a:lnSpc>
+              <a:spcBef>
+                <a:spcPts val="800"/>
+              </a:spcBef>
+              <a:spcAft>
+                <a:spcPts val="0"/>
+              </a:spcAft>
+              <a:buClr>
+                <a:schemeClr val="dk1"/>
+              </a:buClr>
+              <a:buSzPts val="1800"/>
+              <a:buChar char="•"/>
+              <a:defRPr sz="2400"/>
+            </a:lvl3pPr>
+            <a:lvl4pPr marL="2438339" lvl="3" indent="-457189" algn="l">
+              <a:lnSpc>
+                <a:spcPct val="100000"/>
+              </a:lnSpc>
+              <a:spcBef>
+                <a:spcPts val="800"/>
+              </a:spcBef>
+              <a:spcAft>
+                <a:spcPts val="0"/>
+              </a:spcAft>
+              <a:buClr>
+                <a:schemeClr val="dk1"/>
+              </a:buClr>
+              <a:buSzPts val="1800"/>
+              <a:buChar char="–"/>
+              <a:defRPr sz="2400"/>
+            </a:lvl4pPr>
+            <a:lvl5pPr marL="3047924" lvl="4" indent="-457189" algn="l">
+              <a:lnSpc>
+                <a:spcPct val="100000"/>
+              </a:lnSpc>
+              <a:spcBef>
+                <a:spcPts val="800"/>
+              </a:spcBef>
+              <a:spcAft>
+                <a:spcPts val="0"/>
+              </a:spcAft>
+              <a:buClr>
+                <a:schemeClr val="dk1"/>
+              </a:buClr>
+              <a:buSzPts val="1800"/>
+              <a:buChar char="»"/>
+              <a:defRPr sz="2400"/>
+            </a:lvl5pPr>
+            <a:lvl6pPr marL="3657509" lvl="5" indent="-457189" algn="l">
+              <a:lnSpc>
+                <a:spcPct val="100000"/>
+              </a:lnSpc>
+              <a:spcBef>
+                <a:spcPts val="480"/>
+              </a:spcBef>
+              <a:spcAft>
+                <a:spcPts val="0"/>
+              </a:spcAft>
+              <a:buClr>
+                <a:schemeClr val="dk1"/>
+              </a:buClr>
+              <a:buSzPts val="1800"/>
+              <a:buChar char="•"/>
+              <a:defRPr/>
+            </a:lvl6pPr>
+            <a:lvl7pPr marL="4267093" lvl="6" indent="-457189" algn="l">
+              <a:lnSpc>
+                <a:spcPct val="100000"/>
+              </a:lnSpc>
+              <a:spcBef>
+                <a:spcPts val="480"/>
+              </a:spcBef>
+              <a:spcAft>
+                <a:spcPts val="0"/>
+              </a:spcAft>
+              <a:buClr>
+                <a:schemeClr val="dk1"/>
+              </a:buClr>
+              <a:buSzPts val="1800"/>
+              <a:buChar char="•"/>
+              <a:defRPr/>
+            </a:lvl7pPr>
+            <a:lvl8pPr marL="4876678" lvl="7" indent="-457189" algn="l">
+              <a:lnSpc>
+                <a:spcPct val="100000"/>
+              </a:lnSpc>
+              <a:spcBef>
+                <a:spcPts val="480"/>
+              </a:spcBef>
+              <a:spcAft>
+                <a:spcPts val="0"/>
+              </a:spcAft>
+              <a:buClr>
+                <a:schemeClr val="dk1"/>
+              </a:buClr>
+              <a:buSzPts val="1800"/>
+              <a:buChar char="•"/>
+              <a:defRPr/>
+            </a:lvl8pPr>
+            <a:lvl9pPr marL="5486263" lvl="8" indent="-457189" algn="l">
+              <a:lnSpc>
+                <a:spcPct val="100000"/>
+              </a:lnSpc>
+              <a:spcBef>
+                <a:spcPts val="480"/>
+              </a:spcBef>
+              <a:spcAft>
+                <a:spcPts val="0"/>
+              </a:spcAft>
+              <a:buClr>
+                <a:schemeClr val="dk1"/>
+              </a:buClr>
+              <a:buSzPts val="1800"/>
+              <a:buChar char="•"/>
+              <a:defRPr/>
+            </a:lvl9pPr>
+          </a:lstStyle>
+          <a:p>
+            <a:endParaRPr/>
+          </a:p>
+        </p:txBody>
+      </p:sp>
+      <p:pic>
+        <p:nvPicPr>
+          <p:cNvPr id="40" name="Google Shape;40;p14"/>
+          <p:cNvPicPr preferRelativeResize="0"/>
+          <p:nvPr/>
+        </p:nvPicPr>
+        <p:blipFill rotWithShape="1">
+          <a:blip r:embed="rId2">
+            <a:alphaModFix/>
+          </a:blip>
+          <a:srcRect/>
+          <a:stretch/>
+        </p:blipFill>
+        <p:spPr>
+          <a:xfrm>
+            <a:off x="395818" y="6231467"/>
+            <a:ext cx="706967" cy="383117"/>
+          </a:xfrm>
+          <a:prstGeom prst="rect">
+            <a:avLst/>
+          </a:prstGeom>
+          <a:noFill/>
+          <a:ln>
+            <a:noFill/>
+          </a:ln>
+        </p:spPr>
+      </p:pic>
+      <p:cxnSp>
+        <p:nvCxnSpPr>
+          <p:cNvPr id="41" name="Google Shape;41;p14"/>
+          <p:cNvCxnSpPr/>
+          <p:nvPr/>
+        </p:nvCxnSpPr>
+        <p:spPr>
+          <a:xfrm>
+            <a:off x="1305984" y="6184900"/>
+            <a:ext cx="0" cy="510117"/>
+          </a:xfrm>
+          <a:prstGeom prst="straightConnector1">
+            <a:avLst/>
+          </a:prstGeom>
+          <a:noFill/>
+          <a:ln w="9525" cap="flat" cmpd="sng">
+            <a:solidFill>
+              <a:srgbClr val="3D3029"/>
+            </a:solidFill>
+            <a:prstDash val="solid"/>
+            <a:round/>
+            <a:headEnd type="none" w="sm" len="sm"/>
+            <a:tailEnd type="none" w="sm" len="sm"/>
+          </a:ln>
+        </p:spPr>
+      </p:cxnSp>
+      <p:cxnSp>
+        <p:nvCxnSpPr>
+          <p:cNvPr id="42" name="Google Shape;42;p14"/>
+          <p:cNvCxnSpPr/>
+          <p:nvPr/>
+        </p:nvCxnSpPr>
+        <p:spPr>
+          <a:xfrm>
+            <a:off x="10174816" y="6389683"/>
+            <a:ext cx="459317" cy="0"/>
+          </a:xfrm>
+          <a:prstGeom prst="straightConnector1">
+            <a:avLst/>
+          </a:prstGeom>
+          <a:noFill/>
+          <a:ln w="25400" cap="flat" cmpd="sng">
+            <a:solidFill>
+              <a:srgbClr val="000000"/>
+            </a:solidFill>
+            <a:prstDash val="solid"/>
+            <a:round/>
+            <a:headEnd type="none" w="sm" len="sm"/>
+            <a:tailEnd type="none" w="sm" len="sm"/>
+          </a:ln>
+        </p:spPr>
+      </p:cxnSp>
+      <p:sp>
+        <p:nvSpPr>
+          <p:cNvPr id="43" name="Google Shape;43;p14"/>
+          <p:cNvSpPr txBox="1">
+            <a:spLocks noGrp="1"/>
+          </p:cNvSpPr>
+          <p:nvPr>
+            <p:ph type="ftr" idx="11"/>
+          </p:nvPr>
+        </p:nvSpPr>
+        <p:spPr>
+          <a:xfrm>
+            <a:off x="1600201" y="6390217"/>
+            <a:ext cx="6040967" cy="211667"/>
+          </a:xfrm>
+          <a:prstGeom prst="rect">
+            <a:avLst/>
+          </a:prstGeom>
+          <a:noFill/>
+          <a:ln>
+            <a:noFill/>
+          </a:ln>
+        </p:spPr>
+        <p:txBody>
+          <a:bodyPr spcFirstLastPara="1" wrap="square" lIns="0" tIns="0" rIns="0" bIns="0" anchor="b" anchorCtr="0">
+            <a:noAutofit/>
+          </a:bodyPr>
+          <a:lstStyle>
+            <a:lvl1pPr lvl="0" algn="l">
+              <a:lnSpc>
+                <a:spcPct val="100000"/>
+              </a:lnSpc>
+              <a:spcBef>
+                <a:spcPts val="0"/>
+              </a:spcBef>
+              <a:spcAft>
+                <a:spcPts val="0"/>
+              </a:spcAft>
+              <a:buSzPts val="1400"/>
+              <a:buNone/>
+              <a:defRPr/>
+            </a:lvl1pPr>
+            <a:lvl2pPr lvl="1" algn="l">
+              <a:lnSpc>
+                <a:spcPct val="100000"/>
+              </a:lnSpc>
+              <a:spcBef>
+                <a:spcPts val="0"/>
+              </a:spcBef>
+              <a:spcAft>
+                <a:spcPts val="0"/>
+              </a:spcAft>
+              <a:buSzPts val="1400"/>
+              <a:buNone/>
+              <a:defRPr/>
+            </a:lvl2pPr>
+            <a:lvl3pPr lvl="2" algn="l">
+              <a:lnSpc>
+                <a:spcPct val="100000"/>
+              </a:lnSpc>
+              <a:spcBef>
+                <a:spcPts val="0"/>
+              </a:spcBef>
+              <a:spcAft>
+                <a:spcPts val="0"/>
+              </a:spcAft>
+              <a:buSzPts val="1400"/>
+              <a:buNone/>
+              <a:defRPr/>
+            </a:lvl3pPr>
+            <a:lvl4pPr lvl="3" algn="l">
+              <a:lnSpc>
+                <a:spcPct val="100000"/>
+              </a:lnSpc>
+              <a:spcBef>
+                <a:spcPts val="0"/>
+              </a:spcBef>
+              <a:spcAft>
+                <a:spcPts val="0"/>
+              </a:spcAft>
+              <a:buSzPts val="1400"/>
+              <a:buNone/>
+              <a:defRPr/>
+            </a:lvl4pPr>
+            <a:lvl5pPr lvl="4" algn="l">
+              <a:lnSpc>
+                <a:spcPct val="100000"/>
+              </a:lnSpc>
+              <a:spcBef>
+                <a:spcPts val="0"/>
+              </a:spcBef>
+              <a:spcAft>
+                <a:spcPts val="0"/>
+              </a:spcAft>
+              <a:buSzPts val="1400"/>
+              <a:buNone/>
+              <a:defRPr/>
+            </a:lvl5pPr>
+            <a:lvl6pPr lvl="5" algn="l">
+              <a:lnSpc>
+                <a:spcPct val="100000"/>
+              </a:lnSpc>
+              <a:spcBef>
+                <a:spcPts val="0"/>
+              </a:spcBef>
+              <a:spcAft>
+                <a:spcPts val="0"/>
+              </a:spcAft>
+              <a:buSzPts val="1400"/>
+              <a:buNone/>
+              <a:defRPr/>
+            </a:lvl6pPr>
+            <a:lvl7pPr lvl="6" algn="l">
+              <a:lnSpc>
+                <a:spcPct val="100000"/>
+              </a:lnSpc>
+              <a:spcBef>
+                <a:spcPts val="0"/>
+              </a:spcBef>
+              <a:spcAft>
+                <a:spcPts val="0"/>
+              </a:spcAft>
+              <a:buSzPts val="1400"/>
+              <a:buNone/>
+              <a:defRPr/>
+            </a:lvl7pPr>
+            <a:lvl8pPr lvl="7" algn="l">
+              <a:lnSpc>
+                <a:spcPct val="100000"/>
+              </a:lnSpc>
+              <a:spcBef>
+                <a:spcPts val="0"/>
+              </a:spcBef>
+              <a:spcAft>
+                <a:spcPts val="0"/>
+              </a:spcAft>
+              <a:buSzPts val="1400"/>
+              <a:buNone/>
+              <a:defRPr/>
+            </a:lvl8pPr>
+            <a:lvl9pPr lvl="8" algn="l">
+              <a:lnSpc>
+                <a:spcPct val="100000"/>
+              </a:lnSpc>
+              <a:spcBef>
+                <a:spcPts val="0"/>
+              </a:spcBef>
+              <a:spcAft>
+                <a:spcPts val="0"/>
+              </a:spcAft>
+              <a:buSzPts val="1400"/>
+              <a:buNone/>
+              <a:defRPr/>
+            </a:lvl9pPr>
+          </a:lstStyle>
+          <a:p>
+            <a:endParaRPr dirty="0"/>
+          </a:p>
+        </p:txBody>
+      </p:sp>
+      <p:sp>
+        <p:nvSpPr>
+          <p:cNvPr id="44" name="Google Shape;44;p14"/>
+          <p:cNvSpPr txBox="1">
+            <a:spLocks noGrp="1"/>
+          </p:cNvSpPr>
+          <p:nvPr>
+            <p:ph type="sldNum" idx="12"/>
+          </p:nvPr>
+        </p:nvSpPr>
+        <p:spPr>
+          <a:xfrm>
+            <a:off x="10217150" y="6411413"/>
+            <a:ext cx="361951" cy="211667"/>
+          </a:xfrm>
+          <a:prstGeom prst="rect">
+            <a:avLst/>
+          </a:prstGeom>
+          <a:noFill/>
+          <a:ln>
+            <a:noFill/>
+          </a:ln>
+        </p:spPr>
+        <p:txBody>
+          <a:bodyPr spcFirstLastPara="1" wrap="square" lIns="0" tIns="0" rIns="0" bIns="0" anchor="b" anchorCtr="0">
+            <a:noAutofit/>
+          </a:bodyPr>
+          <a:lstStyle>
+            <a:lvl1pPr marL="0" marR="0" lvl="0" indent="0" algn="ctr">
+              <a:lnSpc>
+                <a:spcPct val="100000"/>
+              </a:lnSpc>
+              <a:spcBef>
+                <a:spcPts val="0"/>
+              </a:spcBef>
+              <a:spcAft>
+                <a:spcPts val="0"/>
+              </a:spcAft>
+              <a:buClr>
+                <a:srgbClr val="000000"/>
+              </a:buClr>
+              <a:buSzPts val="700"/>
+              <a:buFont typeface="Arial"/>
+              <a:buNone/>
+              <a:defRPr sz="933" b="0" i="0" u="none" strike="noStrike" cap="none">
+                <a:solidFill>
+                  <a:schemeClr val="dk1"/>
+                </a:solidFill>
+                <a:latin typeface="Arial"/>
+                <a:ea typeface="Arial"/>
+                <a:cs typeface="Arial"/>
+                <a:sym typeface="Arial"/>
+              </a:defRPr>
+            </a:lvl1pPr>
+            <a:lvl2pPr marL="0" marR="0" lvl="1" indent="0" algn="ctr">
+              <a:lnSpc>
+                <a:spcPct val="100000"/>
+              </a:lnSpc>
+              <a:spcBef>
+                <a:spcPts val="0"/>
+              </a:spcBef>
+              <a:spcAft>
+                <a:spcPts val="0"/>
+              </a:spcAft>
+              <a:buClr>
+                <a:srgbClr val="000000"/>
+              </a:buClr>
+              <a:buSzPts val="700"/>
+              <a:buFont typeface="Arial"/>
+              <a:buNone/>
+              <a:defRPr sz="933" b="0" i="0" u="none" strike="noStrike" cap="none">
+                <a:solidFill>
+                  <a:schemeClr val="dk1"/>
+                </a:solidFill>
+                <a:latin typeface="Arial"/>
+                <a:ea typeface="Arial"/>
+                <a:cs typeface="Arial"/>
+                <a:sym typeface="Arial"/>
+              </a:defRPr>
+            </a:lvl2pPr>
+            <a:lvl3pPr marL="0" marR="0" lvl="2" indent="0" algn="ctr">
+              <a:lnSpc>
+                <a:spcPct val="100000"/>
+              </a:lnSpc>
+              <a:spcBef>
+                <a:spcPts val="0"/>
+              </a:spcBef>
+              <a:spcAft>
+                <a:spcPts val="0"/>
+              </a:spcAft>
+              <a:buClr>
+                <a:srgbClr val="000000"/>
+              </a:buClr>
+              <a:buSzPts val="700"/>
+              <a:buFont typeface="Arial"/>
+              <a:buNone/>
+              <a:defRPr sz="933" b="0" i="0" u="none" strike="noStrike" cap="none">
+                <a:solidFill>
+                  <a:schemeClr val="dk1"/>
+                </a:solidFill>
+                <a:latin typeface="Arial"/>
+                <a:ea typeface="Arial"/>
+                <a:cs typeface="Arial"/>
+                <a:sym typeface="Arial"/>
+              </a:defRPr>
+            </a:lvl3pPr>
+            <a:lvl4pPr marL="0" marR="0" lvl="3" indent="0" algn="ctr">
+              <a:lnSpc>
+                <a:spcPct val="100000"/>
+              </a:lnSpc>
+              <a:spcBef>
+                <a:spcPts val="0"/>
+              </a:spcBef>
+              <a:spcAft>
+                <a:spcPts val="0"/>
+              </a:spcAft>
+              <a:buClr>
+                <a:srgbClr val="000000"/>
+              </a:buClr>
+              <a:buSzPts val="700"/>
+              <a:buFont typeface="Arial"/>
+              <a:buNone/>
+              <a:defRPr sz="933" b="0" i="0" u="none" strike="noStrike" cap="none">
+                <a:solidFill>
+                  <a:schemeClr val="dk1"/>
+                </a:solidFill>
+                <a:latin typeface="Arial"/>
+                <a:ea typeface="Arial"/>
+                <a:cs typeface="Arial"/>
+                <a:sym typeface="Arial"/>
+              </a:defRPr>
+            </a:lvl4pPr>
+            <a:lvl5pPr marL="0" marR="0" lvl="4" indent="0" algn="ctr">
+              <a:lnSpc>
+                <a:spcPct val="100000"/>
+              </a:lnSpc>
+              <a:spcBef>
+                <a:spcPts val="0"/>
+              </a:spcBef>
+              <a:spcAft>
+                <a:spcPts val="0"/>
+              </a:spcAft>
+              <a:buClr>
+                <a:srgbClr val="000000"/>
+              </a:buClr>
+              <a:buSzPts val="700"/>
+              <a:buFont typeface="Arial"/>
+              <a:buNone/>
+              <a:defRPr sz="933" b="0" i="0" u="none" strike="noStrike" cap="none">
+                <a:solidFill>
+                  <a:schemeClr val="dk1"/>
+                </a:solidFill>
+                <a:latin typeface="Arial"/>
+                <a:ea typeface="Arial"/>
+                <a:cs typeface="Arial"/>
+                <a:sym typeface="Arial"/>
+              </a:defRPr>
+            </a:lvl5pPr>
+            <a:lvl6pPr marL="0" marR="0" lvl="5" indent="0" algn="ctr">
+              <a:lnSpc>
+                <a:spcPct val="100000"/>
+              </a:lnSpc>
+              <a:spcBef>
+                <a:spcPts val="0"/>
+              </a:spcBef>
+              <a:spcAft>
+                <a:spcPts val="0"/>
+              </a:spcAft>
+              <a:buClr>
+                <a:srgbClr val="000000"/>
+              </a:buClr>
+              <a:buSzPts val="700"/>
+              <a:buFont typeface="Arial"/>
+              <a:buNone/>
+              <a:defRPr sz="933" b="0" i="0" u="none" strike="noStrike" cap="none">
+                <a:solidFill>
+                  <a:schemeClr val="dk1"/>
+                </a:solidFill>
+                <a:latin typeface="Arial"/>
+                <a:ea typeface="Arial"/>
+                <a:cs typeface="Arial"/>
+                <a:sym typeface="Arial"/>
+              </a:defRPr>
+            </a:lvl6pPr>
+            <a:lvl7pPr marL="0" marR="0" lvl="6" indent="0" algn="ctr">
+              <a:lnSpc>
+                <a:spcPct val="100000"/>
+              </a:lnSpc>
+              <a:spcBef>
+                <a:spcPts val="0"/>
+              </a:spcBef>
+              <a:spcAft>
+                <a:spcPts val="0"/>
+              </a:spcAft>
+              <a:buClr>
+                <a:srgbClr val="000000"/>
+              </a:buClr>
+              <a:buSzPts val="700"/>
+              <a:buFont typeface="Arial"/>
+              <a:buNone/>
+              <a:defRPr sz="933" b="0" i="0" u="none" strike="noStrike" cap="none">
+                <a:solidFill>
+                  <a:schemeClr val="dk1"/>
+                </a:solidFill>
+                <a:latin typeface="Arial"/>
+                <a:ea typeface="Arial"/>
+                <a:cs typeface="Arial"/>
+                <a:sym typeface="Arial"/>
+              </a:defRPr>
+            </a:lvl7pPr>
+            <a:lvl8pPr marL="0" marR="0" lvl="7" indent="0" algn="ctr">
+              <a:lnSpc>
+                <a:spcPct val="100000"/>
+              </a:lnSpc>
+              <a:spcBef>
+                <a:spcPts val="0"/>
+              </a:spcBef>
+              <a:spcAft>
+                <a:spcPts val="0"/>
+              </a:spcAft>
+              <a:buClr>
+                <a:srgbClr val="000000"/>
+              </a:buClr>
+              <a:buSzPts val="700"/>
+              <a:buFont typeface="Arial"/>
+              <a:buNone/>
+              <a:defRPr sz="933" b="0" i="0" u="none" strike="noStrike" cap="none">
+                <a:solidFill>
+                  <a:schemeClr val="dk1"/>
+                </a:solidFill>
+                <a:latin typeface="Arial"/>
+                <a:ea typeface="Arial"/>
+                <a:cs typeface="Arial"/>
+                <a:sym typeface="Arial"/>
+              </a:defRPr>
+            </a:lvl8pPr>
+            <a:lvl9pPr marL="0" marR="0" lvl="8" indent="0" algn="ctr">
+              <a:lnSpc>
+                <a:spcPct val="100000"/>
+              </a:lnSpc>
+              <a:spcBef>
+                <a:spcPts val="0"/>
+              </a:spcBef>
+              <a:spcAft>
+                <a:spcPts val="0"/>
+              </a:spcAft>
+              <a:buClr>
+                <a:srgbClr val="000000"/>
+              </a:buClr>
+              <a:buSzPts val="700"/>
+              <a:buFont typeface="Arial"/>
+              <a:buNone/>
+              <a:defRPr sz="933" b="0" i="0" u="none" strike="noStrike" cap="none">
+                <a:solidFill>
+                  <a:schemeClr val="dk1"/>
+                </a:solidFill>
+                <a:latin typeface="Arial"/>
+                <a:ea typeface="Arial"/>
+                <a:cs typeface="Arial"/>
+                <a:sym typeface="Arial"/>
+              </a:defRPr>
+            </a:lvl9pPr>
+          </a:lstStyle>
+          <a:p>
+            <a:fld id="{00000000-1234-1234-1234-123412341234}" type="slidenum">
+              <a:rPr lang="en-US" smtClean="0"/>
+              <a:pPr/>
+              <a:t>‹#›</a:t>
+            </a:fld>
+            <a:endParaRPr lang="en-US" dirty="0"/>
+          </a:p>
+        </p:txBody>
+      </p:sp>
+      <p:pic>
+        <p:nvPicPr>
+          <p:cNvPr id="45" name="Google Shape;45;p14"/>
+          <p:cNvPicPr preferRelativeResize="0"/>
+          <p:nvPr/>
+        </p:nvPicPr>
+        <p:blipFill rotWithShape="1">
+          <a:blip r:embed="rId3">
+            <a:alphaModFix/>
+          </a:blip>
+          <a:srcRect/>
+          <a:stretch/>
+        </p:blipFill>
+        <p:spPr>
+          <a:xfrm>
+            <a:off x="11265957" y="6036324"/>
+            <a:ext cx="445587" cy="658693"/>
+          </a:xfrm>
+          <a:prstGeom prst="rect">
+            <a:avLst/>
+          </a:prstGeom>
+          <a:noFill/>
+          <a:ln>
+            <a:noFill/>
+          </a:ln>
+        </p:spPr>
+      </p:pic>
+    </p:spTree>
+    <p:extLst>
+      <p:ext uri="{BB962C8B-B14F-4D97-AF65-F5344CB8AC3E}">
+        <p14:creationId xmlns:p14="http://schemas.microsoft.com/office/powerpoint/2010/main" val="4042601525"/>
       </p:ext>
     </p:extLst>
   </p:cSld>
@@ -865,7 +1815,7 @@
           <a:p>
             <a:fld id="{A1C33FE8-8021-45D4-B0C5-0B5FC73F013B}" type="datetimeFigureOut">
               <a:rPr lang="en-US" smtClean="0"/>
-              <a:t>3/12/2019</a:t>
+              <a:t>4/8/2025</a:t>
             </a:fld>
             <a:endParaRPr lang="en-US"/>
           </a:p>
@@ -1140,7 +2090,7 @@
           <a:p>
             <a:fld id="{A1C33FE8-8021-45D4-B0C5-0B5FC73F013B}" type="datetimeFigureOut">
               <a:rPr lang="en-US" smtClean="0"/>
-              <a:t>3/12/2019</a:t>
+              <a:t>4/8/2025</a:t>
             </a:fld>
             <a:endParaRPr lang="en-US"/>
           </a:p>
@@ -1405,7 +2355,7 @@
           <a:p>
             <a:fld id="{A1C33FE8-8021-45D4-B0C5-0B5FC73F013B}" type="datetimeFigureOut">
               <a:rPr lang="en-US" smtClean="0"/>
-              <a:t>3/12/2019</a:t>
+              <a:t>4/8/2025</a:t>
             </a:fld>
             <a:endParaRPr lang="en-US"/>
           </a:p>
@@ -1817,7 +2767,7 @@
           <a:p>
             <a:fld id="{A1C33FE8-8021-45D4-B0C5-0B5FC73F013B}" type="datetimeFigureOut">
               <a:rPr lang="en-US" smtClean="0"/>
-              <a:t>3/12/2019</a:t>
+              <a:t>4/8/2025</a:t>
             </a:fld>
             <a:endParaRPr lang="en-US"/>
           </a:p>
@@ -1958,7 +2908,7 @@
           <a:p>
             <a:fld id="{A1C33FE8-8021-45D4-B0C5-0B5FC73F013B}" type="datetimeFigureOut">
               <a:rPr lang="en-US" smtClean="0"/>
-              <a:t>3/12/2019</a:t>
+              <a:t>4/8/2025</a:t>
             </a:fld>
             <a:endParaRPr lang="en-US"/>
           </a:p>
@@ -2071,7 +3021,7 @@
           <a:p>
             <a:fld id="{A1C33FE8-8021-45D4-B0C5-0B5FC73F013B}" type="datetimeFigureOut">
               <a:rPr lang="en-US" smtClean="0"/>
-              <a:t>3/12/2019</a:t>
+              <a:t>4/8/2025</a:t>
             </a:fld>
             <a:endParaRPr lang="en-US"/>
           </a:p>
@@ -2382,7 +3332,7 @@
           <a:p>
             <a:fld id="{A1C33FE8-8021-45D4-B0C5-0B5FC73F013B}" type="datetimeFigureOut">
               <a:rPr lang="en-US" smtClean="0"/>
-              <a:t>3/12/2019</a:t>
+              <a:t>4/8/2025</a:t>
             </a:fld>
             <a:endParaRPr lang="en-US"/>
           </a:p>
@@ -2670,7 +3620,7 @@
           <a:p>
             <a:fld id="{A1C33FE8-8021-45D4-B0C5-0B5FC73F013B}" type="datetimeFigureOut">
               <a:rPr lang="en-US" smtClean="0"/>
-              <a:t>3/12/2019</a:t>
+              <a:t>4/8/2025</a:t>
             </a:fld>
             <a:endParaRPr lang="en-US"/>
           </a:p>
@@ -2911,7 +3861,7 @@
           <a:p>
             <a:fld id="{A1C33FE8-8021-45D4-B0C5-0B5FC73F013B}" type="datetimeFigureOut">
               <a:rPr lang="en-US" smtClean="0"/>
-              <a:t>3/12/2019</a:t>
+              <a:t>4/8/2025</a:t>
             </a:fld>
             <a:endParaRPr lang="en-US"/>
           </a:p>
@@ -3027,6 +3977,7 @@
     <p:sldLayoutId id="2147483657" r:id="rId9"/>
     <p:sldLayoutId id="2147483658" r:id="rId10"/>
     <p:sldLayoutId id="2147483659" r:id="rId11"/>
+    <p:sldLayoutId id="2147483660" r:id="rId12"/>
   </p:sldLayoutIdLst>
   <p:txStyles>
     <p:titleStyle>
@@ -5922,6 +6873,3265 @@
     <p:extLst>
       <p:ext uri="{BB962C8B-B14F-4D97-AF65-F5344CB8AC3E}">
         <p14:creationId xmlns:p14="http://schemas.microsoft.com/office/powerpoint/2010/main" val="3927831198"/>
+      </p:ext>
+    </p:extLst>
+  </p:cSld>
+  <p:clrMapOvr>
+    <a:masterClrMapping/>
+  </p:clrMapOvr>
+</p:sld>
+</file>
+
+<file path=ppt/slides/slide4.xml><?xml version="1.0" encoding="utf-8"?>
+<p:sld xmlns:a="http://schemas.openxmlformats.org/drawingml/2006/main" xmlns:r="http://schemas.openxmlformats.org/officeDocument/2006/relationships" xmlns:p="http://schemas.openxmlformats.org/presentationml/2006/main">
+  <p:cSld>
+    <p:spTree>
+      <p:nvGrpSpPr>
+        <p:cNvPr id="1" name=""/>
+        <p:cNvGrpSpPr/>
+        <p:nvPr/>
+      </p:nvGrpSpPr>
+      <p:grpSpPr>
+        <a:xfrm>
+          <a:off x="0" y="0"/>
+          <a:ext cx="0" cy="0"/>
+          <a:chOff x="0" y="0"/>
+          <a:chExt cx="0" cy="0"/>
+        </a:xfrm>
+      </p:grpSpPr>
+      <p:sp>
+        <p:nvSpPr>
+          <p:cNvPr id="15" name="Title 14">
+            <a:extLst>
+              <a:ext uri="{FF2B5EF4-FFF2-40B4-BE49-F238E27FC236}">
+                <a16:creationId xmlns:a16="http://schemas.microsoft.com/office/drawing/2014/main" id="{B12AAC12-A642-2D53-3DF6-D414DD52CEBA}"/>
+              </a:ext>
+            </a:extLst>
+          </p:cNvPr>
+          <p:cNvSpPr>
+            <a:spLocks noGrp="1"/>
+          </p:cNvSpPr>
+          <p:nvPr>
+            <p:ph type="title"/>
+          </p:nvPr>
+        </p:nvSpPr>
+        <p:spPr/>
+        <p:txBody>
+          <a:bodyPr/>
+          <a:lstStyle/>
+          <a:p>
+            <a:r>
+              <a:rPr lang="en-US" dirty="0"/>
+              <a:t>Quality Reporting – Ecosystem</a:t>
+            </a:r>
+          </a:p>
+        </p:txBody>
+      </p:sp>
+      <p:sp>
+        <p:nvSpPr>
+          <p:cNvPr id="3" name="Rectangle 2">
+            <a:extLst>
+              <a:ext uri="{FF2B5EF4-FFF2-40B4-BE49-F238E27FC236}">
+                <a16:creationId xmlns:a16="http://schemas.microsoft.com/office/drawing/2014/main" id="{192FDB10-F6A8-9E33-9F1F-5CEA1C5673EA}"/>
+              </a:ext>
+            </a:extLst>
+          </p:cNvPr>
+          <p:cNvSpPr/>
+          <p:nvPr/>
+        </p:nvSpPr>
+        <p:spPr>
+          <a:xfrm>
+            <a:off x="4017197" y="4431398"/>
+            <a:ext cx="1539832" cy="905692"/>
+          </a:xfrm>
+          <a:prstGeom prst="rect">
+            <a:avLst/>
+          </a:prstGeom>
+        </p:spPr>
+        <p:style>
+          <a:lnRef idx="2">
+            <a:schemeClr val="accent1">
+              <a:shade val="15000"/>
+            </a:schemeClr>
+          </a:lnRef>
+          <a:fillRef idx="1">
+            <a:schemeClr val="accent1"/>
+          </a:fillRef>
+          <a:effectRef idx="0">
+            <a:schemeClr val="accent1"/>
+          </a:effectRef>
+          <a:fontRef idx="minor">
+            <a:schemeClr val="lt1"/>
+          </a:fontRef>
+        </p:style>
+        <p:txBody>
+          <a:bodyPr rtlCol="0" anchor="ctr"/>
+          <a:lstStyle/>
+          <a:p>
+            <a:pPr algn="ctr"/>
+            <a:r>
+              <a:rPr lang="en-US" sz="1400" dirty="0"/>
+              <a:t>Provider System</a:t>
+            </a:r>
+          </a:p>
+        </p:txBody>
+      </p:sp>
+      <p:sp>
+        <p:nvSpPr>
+          <p:cNvPr id="4" name="Rectangle 3">
+            <a:extLst>
+              <a:ext uri="{FF2B5EF4-FFF2-40B4-BE49-F238E27FC236}">
+                <a16:creationId xmlns:a16="http://schemas.microsoft.com/office/drawing/2014/main" id="{E4BB428D-92AB-4618-98C2-CBB747702124}"/>
+              </a:ext>
+            </a:extLst>
+          </p:cNvPr>
+          <p:cNvSpPr/>
+          <p:nvPr/>
+        </p:nvSpPr>
+        <p:spPr>
+          <a:xfrm>
+            <a:off x="7096861" y="4431398"/>
+            <a:ext cx="1539832" cy="905692"/>
+          </a:xfrm>
+          <a:prstGeom prst="rect">
+            <a:avLst/>
+          </a:prstGeom>
+        </p:spPr>
+        <p:style>
+          <a:lnRef idx="2">
+            <a:schemeClr val="accent1">
+              <a:shade val="15000"/>
+            </a:schemeClr>
+          </a:lnRef>
+          <a:fillRef idx="1">
+            <a:schemeClr val="accent1"/>
+          </a:fillRef>
+          <a:effectRef idx="0">
+            <a:schemeClr val="accent1"/>
+          </a:effectRef>
+          <a:fontRef idx="minor">
+            <a:schemeClr val="lt1"/>
+          </a:fontRef>
+        </p:style>
+        <p:txBody>
+          <a:bodyPr rtlCol="0" anchor="ctr"/>
+          <a:lstStyle/>
+          <a:p>
+            <a:pPr algn="ctr"/>
+            <a:r>
+              <a:rPr lang="en-US" sz="1400" dirty="0"/>
+              <a:t>Receiving System</a:t>
+            </a:r>
+          </a:p>
+        </p:txBody>
+      </p:sp>
+      <p:sp>
+        <p:nvSpPr>
+          <p:cNvPr id="5" name="TextBox 4">
+            <a:extLst>
+              <a:ext uri="{FF2B5EF4-FFF2-40B4-BE49-F238E27FC236}">
+                <a16:creationId xmlns:a16="http://schemas.microsoft.com/office/drawing/2014/main" id="{A3414751-0B08-2ED3-7DA0-4F4D86A2B223}"/>
+              </a:ext>
+            </a:extLst>
+          </p:cNvPr>
+          <p:cNvSpPr txBox="1"/>
+          <p:nvPr/>
+        </p:nvSpPr>
+        <p:spPr>
+          <a:xfrm>
+            <a:off x="5012535" y="3234402"/>
+            <a:ext cx="980268" cy="276999"/>
+          </a:xfrm>
+          <a:prstGeom prst="rect">
+            <a:avLst/>
+          </a:prstGeom>
+          <a:noFill/>
+        </p:spPr>
+        <p:txBody>
+          <a:bodyPr wrap="none" rtlCol="0">
+            <a:spAutoFit/>
+          </a:bodyPr>
+          <a:lstStyle/>
+          <a:p>
+            <a:pPr algn="ctr"/>
+            <a:r>
+              <a:rPr lang="en-US" sz="1200" dirty="0"/>
+              <a:t>Specification</a:t>
+            </a:r>
+          </a:p>
+        </p:txBody>
+      </p:sp>
+      <p:sp>
+        <p:nvSpPr>
+          <p:cNvPr id="6" name="Flowchart: Document 5">
+            <a:extLst>
+              <a:ext uri="{FF2B5EF4-FFF2-40B4-BE49-F238E27FC236}">
+                <a16:creationId xmlns:a16="http://schemas.microsoft.com/office/drawing/2014/main" id="{A296F8FE-E234-557D-558C-170B80C964B8}"/>
+              </a:ext>
+            </a:extLst>
+          </p:cNvPr>
+          <p:cNvSpPr/>
+          <p:nvPr/>
+        </p:nvSpPr>
+        <p:spPr>
+          <a:xfrm>
+            <a:off x="5320580" y="3511400"/>
+            <a:ext cx="364177" cy="377043"/>
+          </a:xfrm>
+          <a:prstGeom prst="flowChartDocument">
+            <a:avLst/>
+          </a:prstGeom>
+          <a:solidFill>
+            <a:schemeClr val="accent6"/>
+          </a:solidFill>
+        </p:spPr>
+        <p:style>
+          <a:lnRef idx="2">
+            <a:schemeClr val="accent1">
+              <a:shade val="50000"/>
+            </a:schemeClr>
+          </a:lnRef>
+          <a:fillRef idx="1">
+            <a:schemeClr val="accent1"/>
+          </a:fillRef>
+          <a:effectRef idx="0">
+            <a:schemeClr val="accent1"/>
+          </a:effectRef>
+          <a:fontRef idx="minor">
+            <a:schemeClr val="lt1"/>
+          </a:fontRef>
+        </p:style>
+        <p:txBody>
+          <a:bodyPr rtlCol="0" anchor="ctr"/>
+          <a:lstStyle/>
+          <a:p>
+            <a:pPr algn="ctr"/>
+            <a:endParaRPr lang="en-US" sz="1400"/>
+          </a:p>
+        </p:txBody>
+      </p:sp>
+      <p:sp>
+        <p:nvSpPr>
+          <p:cNvPr id="7" name="Rectangle 6">
+            <a:extLst>
+              <a:ext uri="{FF2B5EF4-FFF2-40B4-BE49-F238E27FC236}">
+                <a16:creationId xmlns:a16="http://schemas.microsoft.com/office/drawing/2014/main" id="{780AB254-30B8-3E51-2314-209F392C4D68}"/>
+              </a:ext>
+            </a:extLst>
+          </p:cNvPr>
+          <p:cNvSpPr/>
+          <p:nvPr/>
+        </p:nvSpPr>
+        <p:spPr>
+          <a:xfrm>
+            <a:off x="5557028" y="1802169"/>
+            <a:ext cx="1539833" cy="973776"/>
+          </a:xfrm>
+          <a:prstGeom prst="rect">
+            <a:avLst/>
+          </a:prstGeom>
+        </p:spPr>
+        <p:style>
+          <a:lnRef idx="2">
+            <a:schemeClr val="accent1">
+              <a:shade val="50000"/>
+            </a:schemeClr>
+          </a:lnRef>
+          <a:fillRef idx="1">
+            <a:schemeClr val="accent1"/>
+          </a:fillRef>
+          <a:effectRef idx="0">
+            <a:schemeClr val="accent1"/>
+          </a:effectRef>
+          <a:fontRef idx="minor">
+            <a:schemeClr val="lt1"/>
+          </a:fontRef>
+        </p:style>
+        <p:txBody>
+          <a:bodyPr rtlCol="0" anchor="ctr"/>
+          <a:lstStyle/>
+          <a:p>
+            <a:pPr algn="ctr"/>
+            <a:r>
+              <a:rPr lang="en-US" sz="1400" dirty="0"/>
+              <a:t>Authority/</a:t>
+            </a:r>
+          </a:p>
+          <a:p>
+            <a:pPr algn="ctr"/>
+            <a:r>
+              <a:rPr lang="en-US" sz="1400" dirty="0"/>
+              <a:t>Agency</a:t>
+            </a:r>
+          </a:p>
+        </p:txBody>
+      </p:sp>
+      <p:sp>
+        <p:nvSpPr>
+          <p:cNvPr id="8" name="TextBox 7">
+            <a:extLst>
+              <a:ext uri="{FF2B5EF4-FFF2-40B4-BE49-F238E27FC236}">
+                <a16:creationId xmlns:a16="http://schemas.microsoft.com/office/drawing/2014/main" id="{47DC5E0B-23B0-7DB8-4B60-BD2DB5638FC6}"/>
+              </a:ext>
+            </a:extLst>
+          </p:cNvPr>
+          <p:cNvSpPr txBox="1"/>
+          <p:nvPr/>
+        </p:nvSpPr>
+        <p:spPr>
+          <a:xfrm>
+            <a:off x="6013016" y="4228167"/>
+            <a:ext cx="608372" cy="276999"/>
+          </a:xfrm>
+          <a:prstGeom prst="rect">
+            <a:avLst/>
+          </a:prstGeom>
+          <a:noFill/>
+        </p:spPr>
+        <p:txBody>
+          <a:bodyPr wrap="none" rtlCol="0">
+            <a:spAutoFit/>
+          </a:bodyPr>
+          <a:lstStyle/>
+          <a:p>
+            <a:pPr algn="ctr"/>
+            <a:r>
+              <a:rPr lang="en-US" sz="1200" dirty="0"/>
+              <a:t>Report</a:t>
+            </a:r>
+          </a:p>
+        </p:txBody>
+      </p:sp>
+      <p:sp>
+        <p:nvSpPr>
+          <p:cNvPr id="9" name="Flowchart: Document 8">
+            <a:extLst>
+              <a:ext uri="{FF2B5EF4-FFF2-40B4-BE49-F238E27FC236}">
+                <a16:creationId xmlns:a16="http://schemas.microsoft.com/office/drawing/2014/main" id="{45158A6F-A091-B4B0-511F-CE190B1AF9B6}"/>
+              </a:ext>
+            </a:extLst>
+          </p:cNvPr>
+          <p:cNvSpPr/>
+          <p:nvPr/>
+        </p:nvSpPr>
+        <p:spPr>
+          <a:xfrm>
+            <a:off x="6135113" y="4505165"/>
+            <a:ext cx="364177" cy="377043"/>
+          </a:xfrm>
+          <a:prstGeom prst="flowChartDocument">
+            <a:avLst/>
+          </a:prstGeom>
+          <a:solidFill>
+            <a:schemeClr val="tx1">
+              <a:lumMod val="50000"/>
+              <a:lumOff val="50000"/>
+            </a:schemeClr>
+          </a:solidFill>
+        </p:spPr>
+        <p:style>
+          <a:lnRef idx="2">
+            <a:schemeClr val="accent1">
+              <a:shade val="50000"/>
+            </a:schemeClr>
+          </a:lnRef>
+          <a:fillRef idx="1">
+            <a:schemeClr val="accent1"/>
+          </a:fillRef>
+          <a:effectRef idx="0">
+            <a:schemeClr val="accent1"/>
+          </a:effectRef>
+          <a:fontRef idx="minor">
+            <a:schemeClr val="lt1"/>
+          </a:fontRef>
+        </p:style>
+        <p:txBody>
+          <a:bodyPr rtlCol="0" anchor="ctr"/>
+          <a:lstStyle/>
+          <a:p>
+            <a:pPr algn="ctr"/>
+            <a:endParaRPr lang="en-US" sz="1400"/>
+          </a:p>
+        </p:txBody>
+      </p:sp>
+      <p:sp>
+        <p:nvSpPr>
+          <p:cNvPr id="12" name="Rectangle 11">
+            <a:extLst>
+              <a:ext uri="{FF2B5EF4-FFF2-40B4-BE49-F238E27FC236}">
+                <a16:creationId xmlns:a16="http://schemas.microsoft.com/office/drawing/2014/main" id="{4E86E584-6C57-05D6-6FBE-B916237EB88D}"/>
+              </a:ext>
+            </a:extLst>
+          </p:cNvPr>
+          <p:cNvSpPr/>
+          <p:nvPr/>
+        </p:nvSpPr>
+        <p:spPr>
+          <a:xfrm>
+            <a:off x="3761448" y="1517808"/>
+            <a:ext cx="1539833" cy="973776"/>
+          </a:xfrm>
+          <a:prstGeom prst="rect">
+            <a:avLst/>
+          </a:prstGeom>
+        </p:spPr>
+        <p:style>
+          <a:lnRef idx="2">
+            <a:schemeClr val="accent1">
+              <a:shade val="50000"/>
+            </a:schemeClr>
+          </a:lnRef>
+          <a:fillRef idx="1">
+            <a:schemeClr val="accent1"/>
+          </a:fillRef>
+          <a:effectRef idx="0">
+            <a:schemeClr val="accent1"/>
+          </a:effectRef>
+          <a:fontRef idx="minor">
+            <a:schemeClr val="lt1"/>
+          </a:fontRef>
+        </p:style>
+        <p:txBody>
+          <a:bodyPr rtlCol="0" anchor="ctr"/>
+          <a:lstStyle/>
+          <a:p>
+            <a:pPr algn="ctr"/>
+            <a:r>
+              <a:rPr lang="en-US" sz="1400" dirty="0"/>
+              <a:t>Measure Specifications</a:t>
+            </a:r>
+          </a:p>
+        </p:txBody>
+      </p:sp>
+      <p:sp>
+        <p:nvSpPr>
+          <p:cNvPr id="13" name="Rectangle 12">
+            <a:extLst>
+              <a:ext uri="{FF2B5EF4-FFF2-40B4-BE49-F238E27FC236}">
+                <a16:creationId xmlns:a16="http://schemas.microsoft.com/office/drawing/2014/main" id="{19BC7517-50A8-A636-39B7-19F92483F07C}"/>
+              </a:ext>
+            </a:extLst>
+          </p:cNvPr>
+          <p:cNvSpPr/>
+          <p:nvPr/>
+        </p:nvSpPr>
+        <p:spPr>
+          <a:xfrm>
+            <a:off x="2952828" y="2774315"/>
+            <a:ext cx="1539833" cy="973776"/>
+          </a:xfrm>
+          <a:prstGeom prst="rect">
+            <a:avLst/>
+          </a:prstGeom>
+        </p:spPr>
+        <p:style>
+          <a:lnRef idx="2">
+            <a:schemeClr val="accent1">
+              <a:shade val="50000"/>
+            </a:schemeClr>
+          </a:lnRef>
+          <a:fillRef idx="1">
+            <a:schemeClr val="accent1"/>
+          </a:fillRef>
+          <a:effectRef idx="0">
+            <a:schemeClr val="accent1"/>
+          </a:effectRef>
+          <a:fontRef idx="minor">
+            <a:schemeClr val="lt1"/>
+          </a:fontRef>
+        </p:style>
+        <p:txBody>
+          <a:bodyPr rtlCol="0" anchor="ctr"/>
+          <a:lstStyle/>
+          <a:p>
+            <a:pPr algn="ctr"/>
+            <a:r>
+              <a:rPr lang="en-US" sz="1400" dirty="0"/>
+              <a:t>Terminology</a:t>
+            </a:r>
+          </a:p>
+        </p:txBody>
+      </p:sp>
+      <p:sp>
+        <p:nvSpPr>
+          <p:cNvPr id="28" name="Arrow: Right 27">
+            <a:extLst>
+              <a:ext uri="{FF2B5EF4-FFF2-40B4-BE49-F238E27FC236}">
+                <a16:creationId xmlns:a16="http://schemas.microsoft.com/office/drawing/2014/main" id="{9B6449AB-2D86-4BD4-25D0-E1775020076A}"/>
+              </a:ext>
+            </a:extLst>
+          </p:cNvPr>
+          <p:cNvSpPr/>
+          <p:nvPr/>
+        </p:nvSpPr>
+        <p:spPr>
+          <a:xfrm>
+            <a:off x="5837741" y="4991669"/>
+            <a:ext cx="978408" cy="242316"/>
+          </a:xfrm>
+          <a:prstGeom prst="rightArrow">
+            <a:avLst/>
+          </a:prstGeom>
+        </p:spPr>
+        <p:style>
+          <a:lnRef idx="2">
+            <a:schemeClr val="accent1">
+              <a:shade val="15000"/>
+            </a:schemeClr>
+          </a:lnRef>
+          <a:fillRef idx="1">
+            <a:schemeClr val="accent1"/>
+          </a:fillRef>
+          <a:effectRef idx="0">
+            <a:schemeClr val="accent1"/>
+          </a:effectRef>
+          <a:fontRef idx="minor">
+            <a:schemeClr val="lt1"/>
+          </a:fontRef>
+        </p:style>
+        <p:txBody>
+          <a:bodyPr rtlCol="0" anchor="ctr"/>
+          <a:lstStyle/>
+          <a:p>
+            <a:pPr algn="ctr"/>
+            <a:endParaRPr lang="en-US" sz="1400"/>
+          </a:p>
+        </p:txBody>
+      </p:sp>
+      <p:sp>
+        <p:nvSpPr>
+          <p:cNvPr id="48" name="Arrow: Down 47">
+            <a:extLst>
+              <a:ext uri="{FF2B5EF4-FFF2-40B4-BE49-F238E27FC236}">
+                <a16:creationId xmlns:a16="http://schemas.microsoft.com/office/drawing/2014/main" id="{1238D0C3-DAAF-1745-4C96-F1DDBC201139}"/>
+              </a:ext>
+            </a:extLst>
+          </p:cNvPr>
+          <p:cNvSpPr/>
+          <p:nvPr/>
+        </p:nvSpPr>
+        <p:spPr>
+          <a:xfrm>
+            <a:off x="4822694" y="2639293"/>
+            <a:ext cx="219605" cy="1604264"/>
+          </a:xfrm>
+          <a:prstGeom prst="downArrow">
+            <a:avLst/>
+          </a:prstGeom>
+        </p:spPr>
+        <p:style>
+          <a:lnRef idx="2">
+            <a:schemeClr val="accent1">
+              <a:shade val="15000"/>
+            </a:schemeClr>
+          </a:lnRef>
+          <a:fillRef idx="1">
+            <a:schemeClr val="accent1"/>
+          </a:fillRef>
+          <a:effectRef idx="0">
+            <a:schemeClr val="accent1"/>
+          </a:effectRef>
+          <a:fontRef idx="minor">
+            <a:schemeClr val="lt1"/>
+          </a:fontRef>
+        </p:style>
+        <p:txBody>
+          <a:bodyPr rtlCol="0" anchor="ctr"/>
+          <a:lstStyle/>
+          <a:p>
+            <a:pPr algn="ctr"/>
+            <a:endParaRPr lang="en-US" sz="1400"/>
+          </a:p>
+        </p:txBody>
+      </p:sp>
+      <p:sp>
+        <p:nvSpPr>
+          <p:cNvPr id="49" name="Arrow: Down 48">
+            <a:extLst>
+              <a:ext uri="{FF2B5EF4-FFF2-40B4-BE49-F238E27FC236}">
+                <a16:creationId xmlns:a16="http://schemas.microsoft.com/office/drawing/2014/main" id="{8D5FE82A-F970-4700-495F-E243EA30201B}"/>
+              </a:ext>
+            </a:extLst>
+          </p:cNvPr>
+          <p:cNvSpPr/>
+          <p:nvPr/>
+        </p:nvSpPr>
+        <p:spPr>
+          <a:xfrm>
+            <a:off x="4146839" y="3868143"/>
+            <a:ext cx="219605" cy="413011"/>
+          </a:xfrm>
+          <a:prstGeom prst="downArrow">
+            <a:avLst/>
+          </a:prstGeom>
+        </p:spPr>
+        <p:style>
+          <a:lnRef idx="2">
+            <a:schemeClr val="accent1">
+              <a:shade val="15000"/>
+            </a:schemeClr>
+          </a:lnRef>
+          <a:fillRef idx="1">
+            <a:schemeClr val="accent1"/>
+          </a:fillRef>
+          <a:effectRef idx="0">
+            <a:schemeClr val="accent1"/>
+          </a:effectRef>
+          <a:fontRef idx="minor">
+            <a:schemeClr val="lt1"/>
+          </a:fontRef>
+        </p:style>
+        <p:txBody>
+          <a:bodyPr rtlCol="0" anchor="ctr"/>
+          <a:lstStyle/>
+          <a:p>
+            <a:pPr algn="ctr"/>
+            <a:endParaRPr lang="en-US" sz="1400"/>
+          </a:p>
+        </p:txBody>
+      </p:sp>
+      <p:pic>
+        <p:nvPicPr>
+          <p:cNvPr id="11" name="Picture 10">
+            <a:extLst>
+              <a:ext uri="{FF2B5EF4-FFF2-40B4-BE49-F238E27FC236}">
+                <a16:creationId xmlns:a16="http://schemas.microsoft.com/office/drawing/2014/main" id="{96284701-321C-08C9-630C-D9F6369C0452}"/>
+              </a:ext>
+            </a:extLst>
+          </p:cNvPr>
+          <p:cNvPicPr>
+            <a:picLocks noChangeAspect="1"/>
+          </p:cNvPicPr>
+          <p:nvPr/>
+        </p:nvPicPr>
+        <p:blipFill>
+          <a:blip r:embed="rId2">
+            <a:extLst>
+              <a:ext uri="{28A0092B-C50C-407E-A947-70E740481C1C}">
+                <a14:useLocalDpi xmlns:a14="http://schemas.microsoft.com/office/drawing/2010/main" val="0"/>
+              </a:ext>
+            </a:extLst>
+          </a:blip>
+          <a:stretch>
+            <a:fillRect/>
+          </a:stretch>
+        </p:blipFill>
+        <p:spPr>
+          <a:xfrm>
+            <a:off x="0" y="6563032"/>
+            <a:ext cx="1128965" cy="211681"/>
+          </a:xfrm>
+          <a:prstGeom prst="rect">
+            <a:avLst/>
+          </a:prstGeom>
+        </p:spPr>
+      </p:pic>
+    </p:spTree>
+    <p:extLst>
+      <p:ext uri="{BB962C8B-B14F-4D97-AF65-F5344CB8AC3E}">
+        <p14:creationId xmlns:p14="http://schemas.microsoft.com/office/powerpoint/2010/main" val="1034617329"/>
+      </p:ext>
+    </p:extLst>
+  </p:cSld>
+  <p:clrMapOvr>
+    <a:masterClrMapping/>
+  </p:clrMapOvr>
+</p:sld>
+</file>
+
+<file path=ppt/slides/slide5.xml><?xml version="1.0" encoding="utf-8"?>
+<p:sld xmlns:a="http://schemas.openxmlformats.org/drawingml/2006/main" xmlns:r="http://schemas.openxmlformats.org/officeDocument/2006/relationships" xmlns:p="http://schemas.openxmlformats.org/presentationml/2006/main">
+  <p:cSld>
+    <p:spTree>
+      <p:nvGrpSpPr>
+        <p:cNvPr id="1" name=""/>
+        <p:cNvGrpSpPr/>
+        <p:nvPr/>
+      </p:nvGrpSpPr>
+      <p:grpSpPr>
+        <a:xfrm>
+          <a:off x="0" y="0"/>
+          <a:ext cx="0" cy="0"/>
+          <a:chOff x="0" y="0"/>
+          <a:chExt cx="0" cy="0"/>
+        </a:xfrm>
+      </p:grpSpPr>
+      <p:sp>
+        <p:nvSpPr>
+          <p:cNvPr id="15" name="Title 14">
+            <a:extLst>
+              <a:ext uri="{FF2B5EF4-FFF2-40B4-BE49-F238E27FC236}">
+                <a16:creationId xmlns:a16="http://schemas.microsoft.com/office/drawing/2014/main" id="{B61C61F2-038D-B1B0-C85D-12EFCC7333D6}"/>
+              </a:ext>
+            </a:extLst>
+          </p:cNvPr>
+          <p:cNvSpPr>
+            <a:spLocks noGrp="1"/>
+          </p:cNvSpPr>
+          <p:nvPr>
+            <p:ph type="title"/>
+          </p:nvPr>
+        </p:nvSpPr>
+        <p:spPr/>
+        <p:txBody>
+          <a:bodyPr/>
+          <a:lstStyle/>
+          <a:p>
+            <a:r>
+              <a:rPr lang="en-US" dirty="0"/>
+              <a:t>Quality Reporting – IGs</a:t>
+            </a:r>
+          </a:p>
+        </p:txBody>
+      </p:sp>
+      <p:sp>
+        <p:nvSpPr>
+          <p:cNvPr id="3" name="Rectangle 2">
+            <a:extLst>
+              <a:ext uri="{FF2B5EF4-FFF2-40B4-BE49-F238E27FC236}">
+                <a16:creationId xmlns:a16="http://schemas.microsoft.com/office/drawing/2014/main" id="{192FDB10-F6A8-9E33-9F1F-5CEA1C5673EA}"/>
+              </a:ext>
+            </a:extLst>
+          </p:cNvPr>
+          <p:cNvSpPr/>
+          <p:nvPr/>
+        </p:nvSpPr>
+        <p:spPr>
+          <a:xfrm>
+            <a:off x="4008549" y="4412281"/>
+            <a:ext cx="1539832" cy="905692"/>
+          </a:xfrm>
+          <a:prstGeom prst="rect">
+            <a:avLst/>
+          </a:prstGeom>
+        </p:spPr>
+        <p:style>
+          <a:lnRef idx="2">
+            <a:schemeClr val="accent1">
+              <a:shade val="15000"/>
+            </a:schemeClr>
+          </a:lnRef>
+          <a:fillRef idx="1">
+            <a:schemeClr val="accent1"/>
+          </a:fillRef>
+          <a:effectRef idx="0">
+            <a:schemeClr val="accent1"/>
+          </a:effectRef>
+          <a:fontRef idx="minor">
+            <a:schemeClr val="lt1"/>
+          </a:fontRef>
+        </p:style>
+        <p:txBody>
+          <a:bodyPr rtlCol="0" anchor="ctr"/>
+          <a:lstStyle/>
+          <a:p>
+            <a:pPr algn="ctr"/>
+            <a:r>
+              <a:rPr lang="en-US" sz="1400" dirty="0"/>
+              <a:t>Provider System</a:t>
+            </a:r>
+          </a:p>
+        </p:txBody>
+      </p:sp>
+      <p:sp>
+        <p:nvSpPr>
+          <p:cNvPr id="4" name="Rectangle 3">
+            <a:extLst>
+              <a:ext uri="{FF2B5EF4-FFF2-40B4-BE49-F238E27FC236}">
+                <a16:creationId xmlns:a16="http://schemas.microsoft.com/office/drawing/2014/main" id="{E4BB428D-92AB-4618-98C2-CBB747702124}"/>
+              </a:ext>
+            </a:extLst>
+          </p:cNvPr>
+          <p:cNvSpPr/>
+          <p:nvPr/>
+        </p:nvSpPr>
+        <p:spPr>
+          <a:xfrm>
+            <a:off x="7088213" y="4412281"/>
+            <a:ext cx="1539832" cy="905692"/>
+          </a:xfrm>
+          <a:prstGeom prst="rect">
+            <a:avLst/>
+          </a:prstGeom>
+        </p:spPr>
+        <p:style>
+          <a:lnRef idx="2">
+            <a:schemeClr val="accent1">
+              <a:shade val="15000"/>
+            </a:schemeClr>
+          </a:lnRef>
+          <a:fillRef idx="1">
+            <a:schemeClr val="accent1"/>
+          </a:fillRef>
+          <a:effectRef idx="0">
+            <a:schemeClr val="accent1"/>
+          </a:effectRef>
+          <a:fontRef idx="minor">
+            <a:schemeClr val="lt1"/>
+          </a:fontRef>
+        </p:style>
+        <p:txBody>
+          <a:bodyPr rtlCol="0" anchor="ctr"/>
+          <a:lstStyle/>
+          <a:p>
+            <a:pPr algn="ctr"/>
+            <a:r>
+              <a:rPr lang="en-US" sz="1400" dirty="0"/>
+              <a:t>Receiving System</a:t>
+            </a:r>
+          </a:p>
+        </p:txBody>
+      </p:sp>
+      <p:sp>
+        <p:nvSpPr>
+          <p:cNvPr id="5" name="TextBox 4">
+            <a:extLst>
+              <a:ext uri="{FF2B5EF4-FFF2-40B4-BE49-F238E27FC236}">
+                <a16:creationId xmlns:a16="http://schemas.microsoft.com/office/drawing/2014/main" id="{A3414751-0B08-2ED3-7DA0-4F4D86A2B223}"/>
+              </a:ext>
+            </a:extLst>
+          </p:cNvPr>
+          <p:cNvSpPr txBox="1"/>
+          <p:nvPr/>
+        </p:nvSpPr>
+        <p:spPr>
+          <a:xfrm>
+            <a:off x="5003887" y="3215285"/>
+            <a:ext cx="980268" cy="276999"/>
+          </a:xfrm>
+          <a:prstGeom prst="rect">
+            <a:avLst/>
+          </a:prstGeom>
+          <a:noFill/>
+        </p:spPr>
+        <p:txBody>
+          <a:bodyPr wrap="none" rtlCol="0">
+            <a:spAutoFit/>
+          </a:bodyPr>
+          <a:lstStyle/>
+          <a:p>
+            <a:pPr algn="ctr"/>
+            <a:r>
+              <a:rPr lang="en-US" sz="1200" dirty="0"/>
+              <a:t>Specification</a:t>
+            </a:r>
+          </a:p>
+        </p:txBody>
+      </p:sp>
+      <p:sp>
+        <p:nvSpPr>
+          <p:cNvPr id="6" name="Flowchart: Document 5">
+            <a:extLst>
+              <a:ext uri="{FF2B5EF4-FFF2-40B4-BE49-F238E27FC236}">
+                <a16:creationId xmlns:a16="http://schemas.microsoft.com/office/drawing/2014/main" id="{A296F8FE-E234-557D-558C-170B80C964B8}"/>
+              </a:ext>
+            </a:extLst>
+          </p:cNvPr>
+          <p:cNvSpPr/>
+          <p:nvPr/>
+        </p:nvSpPr>
+        <p:spPr>
+          <a:xfrm>
+            <a:off x="5311932" y="3492283"/>
+            <a:ext cx="364177" cy="377043"/>
+          </a:xfrm>
+          <a:prstGeom prst="flowChartDocument">
+            <a:avLst/>
+          </a:prstGeom>
+          <a:solidFill>
+            <a:schemeClr val="accent6"/>
+          </a:solidFill>
+        </p:spPr>
+        <p:style>
+          <a:lnRef idx="2">
+            <a:schemeClr val="accent1">
+              <a:shade val="50000"/>
+            </a:schemeClr>
+          </a:lnRef>
+          <a:fillRef idx="1">
+            <a:schemeClr val="accent1"/>
+          </a:fillRef>
+          <a:effectRef idx="0">
+            <a:schemeClr val="accent1"/>
+          </a:effectRef>
+          <a:fontRef idx="minor">
+            <a:schemeClr val="lt1"/>
+          </a:fontRef>
+        </p:style>
+        <p:txBody>
+          <a:bodyPr rtlCol="0" anchor="ctr"/>
+          <a:lstStyle/>
+          <a:p>
+            <a:pPr algn="ctr"/>
+            <a:endParaRPr lang="en-US" sz="1400"/>
+          </a:p>
+        </p:txBody>
+      </p:sp>
+      <p:sp>
+        <p:nvSpPr>
+          <p:cNvPr id="7" name="Rectangle 6">
+            <a:extLst>
+              <a:ext uri="{FF2B5EF4-FFF2-40B4-BE49-F238E27FC236}">
+                <a16:creationId xmlns:a16="http://schemas.microsoft.com/office/drawing/2014/main" id="{780AB254-30B8-3E51-2314-209F392C4D68}"/>
+              </a:ext>
+            </a:extLst>
+          </p:cNvPr>
+          <p:cNvSpPr/>
+          <p:nvPr/>
+        </p:nvSpPr>
+        <p:spPr>
+          <a:xfrm>
+            <a:off x="6188459" y="1646400"/>
+            <a:ext cx="1539833" cy="973776"/>
+          </a:xfrm>
+          <a:prstGeom prst="rect">
+            <a:avLst/>
+          </a:prstGeom>
+        </p:spPr>
+        <p:style>
+          <a:lnRef idx="2">
+            <a:schemeClr val="accent1">
+              <a:shade val="50000"/>
+            </a:schemeClr>
+          </a:lnRef>
+          <a:fillRef idx="1">
+            <a:schemeClr val="accent1"/>
+          </a:fillRef>
+          <a:effectRef idx="0">
+            <a:schemeClr val="accent1"/>
+          </a:effectRef>
+          <a:fontRef idx="minor">
+            <a:schemeClr val="lt1"/>
+          </a:fontRef>
+        </p:style>
+        <p:txBody>
+          <a:bodyPr rtlCol="0" anchor="ctr"/>
+          <a:lstStyle/>
+          <a:p>
+            <a:pPr algn="ctr"/>
+            <a:r>
+              <a:rPr lang="en-US" sz="1400" dirty="0"/>
+              <a:t>Authority/</a:t>
+            </a:r>
+          </a:p>
+          <a:p>
+            <a:pPr algn="ctr"/>
+            <a:r>
+              <a:rPr lang="en-US" sz="1400" dirty="0"/>
+              <a:t>Agency</a:t>
+            </a:r>
+          </a:p>
+        </p:txBody>
+      </p:sp>
+      <p:sp>
+        <p:nvSpPr>
+          <p:cNvPr id="8" name="TextBox 7">
+            <a:extLst>
+              <a:ext uri="{FF2B5EF4-FFF2-40B4-BE49-F238E27FC236}">
+                <a16:creationId xmlns:a16="http://schemas.microsoft.com/office/drawing/2014/main" id="{47DC5E0B-23B0-7DB8-4B60-BD2DB5638FC6}"/>
+              </a:ext>
+            </a:extLst>
+          </p:cNvPr>
+          <p:cNvSpPr txBox="1"/>
+          <p:nvPr/>
+        </p:nvSpPr>
+        <p:spPr>
+          <a:xfrm>
+            <a:off x="6004370" y="4209050"/>
+            <a:ext cx="608372" cy="276999"/>
+          </a:xfrm>
+          <a:prstGeom prst="rect">
+            <a:avLst/>
+          </a:prstGeom>
+          <a:noFill/>
+        </p:spPr>
+        <p:txBody>
+          <a:bodyPr wrap="none" rtlCol="0">
+            <a:spAutoFit/>
+          </a:bodyPr>
+          <a:lstStyle/>
+          <a:p>
+            <a:pPr algn="ctr"/>
+            <a:r>
+              <a:rPr lang="en-US" sz="1200" dirty="0"/>
+              <a:t>Report</a:t>
+            </a:r>
+          </a:p>
+        </p:txBody>
+      </p:sp>
+      <p:sp>
+        <p:nvSpPr>
+          <p:cNvPr id="9" name="Flowchart: Document 8">
+            <a:extLst>
+              <a:ext uri="{FF2B5EF4-FFF2-40B4-BE49-F238E27FC236}">
+                <a16:creationId xmlns:a16="http://schemas.microsoft.com/office/drawing/2014/main" id="{45158A6F-A091-B4B0-511F-CE190B1AF9B6}"/>
+              </a:ext>
+            </a:extLst>
+          </p:cNvPr>
+          <p:cNvSpPr/>
+          <p:nvPr/>
+        </p:nvSpPr>
+        <p:spPr>
+          <a:xfrm>
+            <a:off x="6126465" y="4486048"/>
+            <a:ext cx="364177" cy="377043"/>
+          </a:xfrm>
+          <a:prstGeom prst="flowChartDocument">
+            <a:avLst/>
+          </a:prstGeom>
+          <a:solidFill>
+            <a:schemeClr val="tx1">
+              <a:lumMod val="50000"/>
+              <a:lumOff val="50000"/>
+            </a:schemeClr>
+          </a:solidFill>
+        </p:spPr>
+        <p:style>
+          <a:lnRef idx="2">
+            <a:schemeClr val="accent1">
+              <a:shade val="50000"/>
+            </a:schemeClr>
+          </a:lnRef>
+          <a:fillRef idx="1">
+            <a:schemeClr val="accent1"/>
+          </a:fillRef>
+          <a:effectRef idx="0">
+            <a:schemeClr val="accent1"/>
+          </a:effectRef>
+          <a:fontRef idx="minor">
+            <a:schemeClr val="lt1"/>
+          </a:fontRef>
+        </p:style>
+        <p:txBody>
+          <a:bodyPr rtlCol="0" anchor="ctr"/>
+          <a:lstStyle/>
+          <a:p>
+            <a:pPr algn="ctr"/>
+            <a:endParaRPr lang="en-US" sz="1400"/>
+          </a:p>
+        </p:txBody>
+      </p:sp>
+      <p:sp>
+        <p:nvSpPr>
+          <p:cNvPr id="12" name="Rectangle 11">
+            <a:extLst>
+              <a:ext uri="{FF2B5EF4-FFF2-40B4-BE49-F238E27FC236}">
+                <a16:creationId xmlns:a16="http://schemas.microsoft.com/office/drawing/2014/main" id="{4E86E584-6C57-05D6-6FBE-B916237EB88D}"/>
+              </a:ext>
+            </a:extLst>
+          </p:cNvPr>
+          <p:cNvSpPr/>
+          <p:nvPr/>
+        </p:nvSpPr>
+        <p:spPr>
+          <a:xfrm>
+            <a:off x="3752800" y="1498691"/>
+            <a:ext cx="1539833" cy="973776"/>
+          </a:xfrm>
+          <a:prstGeom prst="rect">
+            <a:avLst/>
+          </a:prstGeom>
+        </p:spPr>
+        <p:style>
+          <a:lnRef idx="2">
+            <a:schemeClr val="accent1">
+              <a:shade val="50000"/>
+            </a:schemeClr>
+          </a:lnRef>
+          <a:fillRef idx="1">
+            <a:schemeClr val="accent1"/>
+          </a:fillRef>
+          <a:effectRef idx="0">
+            <a:schemeClr val="accent1"/>
+          </a:effectRef>
+          <a:fontRef idx="minor">
+            <a:schemeClr val="lt1"/>
+          </a:fontRef>
+        </p:style>
+        <p:txBody>
+          <a:bodyPr rtlCol="0" anchor="ctr"/>
+          <a:lstStyle/>
+          <a:p>
+            <a:pPr algn="ctr"/>
+            <a:r>
+              <a:rPr lang="en-US" sz="1400" dirty="0"/>
+              <a:t>Measure Repository</a:t>
+            </a:r>
+          </a:p>
+        </p:txBody>
+      </p:sp>
+      <p:sp>
+        <p:nvSpPr>
+          <p:cNvPr id="13" name="Rectangle 12">
+            <a:extLst>
+              <a:ext uri="{FF2B5EF4-FFF2-40B4-BE49-F238E27FC236}">
+                <a16:creationId xmlns:a16="http://schemas.microsoft.com/office/drawing/2014/main" id="{19BC7517-50A8-A636-39B7-19F92483F07C}"/>
+              </a:ext>
+            </a:extLst>
+          </p:cNvPr>
+          <p:cNvSpPr/>
+          <p:nvPr/>
+        </p:nvSpPr>
+        <p:spPr>
+          <a:xfrm>
+            <a:off x="2944180" y="2755197"/>
+            <a:ext cx="1539833" cy="973776"/>
+          </a:xfrm>
+          <a:prstGeom prst="rect">
+            <a:avLst/>
+          </a:prstGeom>
+        </p:spPr>
+        <p:style>
+          <a:lnRef idx="2">
+            <a:schemeClr val="accent1">
+              <a:shade val="50000"/>
+            </a:schemeClr>
+          </a:lnRef>
+          <a:fillRef idx="1">
+            <a:schemeClr val="accent1"/>
+          </a:fillRef>
+          <a:effectRef idx="0">
+            <a:schemeClr val="accent1"/>
+          </a:effectRef>
+          <a:fontRef idx="minor">
+            <a:schemeClr val="lt1"/>
+          </a:fontRef>
+        </p:style>
+        <p:txBody>
+          <a:bodyPr rtlCol="0" anchor="ctr"/>
+          <a:lstStyle/>
+          <a:p>
+            <a:pPr algn="ctr"/>
+            <a:r>
+              <a:rPr lang="en-US" sz="1400" dirty="0"/>
+              <a:t>Terminology</a:t>
+            </a:r>
+          </a:p>
+          <a:p>
+            <a:pPr algn="ctr"/>
+            <a:r>
+              <a:rPr lang="en-US" sz="1400" dirty="0"/>
+              <a:t>Service</a:t>
+            </a:r>
+          </a:p>
+        </p:txBody>
+      </p:sp>
+      <p:sp>
+        <p:nvSpPr>
+          <p:cNvPr id="10" name="TextBox 9">
+            <a:extLst>
+              <a:ext uri="{FF2B5EF4-FFF2-40B4-BE49-F238E27FC236}">
+                <a16:creationId xmlns:a16="http://schemas.microsoft.com/office/drawing/2014/main" id="{9EF40D12-DEED-782C-413F-7716094D97BA}"/>
+              </a:ext>
+            </a:extLst>
+          </p:cNvPr>
+          <p:cNvSpPr txBox="1"/>
+          <p:nvPr/>
+        </p:nvSpPr>
+        <p:spPr>
+          <a:xfrm>
+            <a:off x="7190893" y="3382214"/>
+            <a:ext cx="1210592" cy="307777"/>
+          </a:xfrm>
+          <a:prstGeom prst="rect">
+            <a:avLst/>
+          </a:prstGeom>
+          <a:noFill/>
+        </p:spPr>
+        <p:txBody>
+          <a:bodyPr wrap="square" rtlCol="0">
+            <a:spAutoFit/>
+          </a:bodyPr>
+          <a:lstStyle/>
+          <a:p>
+            <a:r>
+              <a:rPr lang="en-US" sz="1400" dirty="0"/>
+              <a:t>Measure</a:t>
+            </a:r>
+          </a:p>
+        </p:txBody>
+      </p:sp>
+      <p:cxnSp>
+        <p:nvCxnSpPr>
+          <p:cNvPr id="18" name="Straight Arrow Connector 17">
+            <a:extLst>
+              <a:ext uri="{FF2B5EF4-FFF2-40B4-BE49-F238E27FC236}">
+                <a16:creationId xmlns:a16="http://schemas.microsoft.com/office/drawing/2014/main" id="{86A645A3-C484-2A7E-1F79-8A3DB80A2289}"/>
+              </a:ext>
+            </a:extLst>
+          </p:cNvPr>
+          <p:cNvCxnSpPr>
+            <a:cxnSpLocks/>
+            <a:stCxn id="10" idx="1"/>
+            <a:endCxn id="6" idx="3"/>
+          </p:cNvCxnSpPr>
+          <p:nvPr/>
+        </p:nvCxnSpPr>
+        <p:spPr>
+          <a:xfrm flipH="1">
+            <a:off x="5676109" y="3536103"/>
+            <a:ext cx="1514784" cy="144702"/>
+          </a:xfrm>
+          <a:prstGeom prst="straightConnector1">
+            <a:avLst/>
+          </a:prstGeom>
+          <a:ln>
+            <a:tailEnd type="triangle"/>
+          </a:ln>
+        </p:spPr>
+        <p:style>
+          <a:lnRef idx="3">
+            <a:schemeClr val="accent1"/>
+          </a:lnRef>
+          <a:fillRef idx="0">
+            <a:schemeClr val="accent1"/>
+          </a:fillRef>
+          <a:effectRef idx="2">
+            <a:schemeClr val="accent1"/>
+          </a:effectRef>
+          <a:fontRef idx="minor">
+            <a:schemeClr val="tx1"/>
+          </a:fontRef>
+        </p:style>
+      </p:cxnSp>
+      <p:sp>
+        <p:nvSpPr>
+          <p:cNvPr id="22" name="TextBox 21">
+            <a:extLst>
+              <a:ext uri="{FF2B5EF4-FFF2-40B4-BE49-F238E27FC236}">
+                <a16:creationId xmlns:a16="http://schemas.microsoft.com/office/drawing/2014/main" id="{96E2C6D9-061B-9B01-0F0F-F36515C342D1}"/>
+              </a:ext>
+            </a:extLst>
+          </p:cNvPr>
+          <p:cNvSpPr txBox="1"/>
+          <p:nvPr/>
+        </p:nvSpPr>
+        <p:spPr>
+          <a:xfrm>
+            <a:off x="7120620" y="3952149"/>
+            <a:ext cx="1326902" cy="307777"/>
+          </a:xfrm>
+          <a:prstGeom prst="rect">
+            <a:avLst/>
+          </a:prstGeom>
+          <a:noFill/>
+        </p:spPr>
+        <p:txBody>
+          <a:bodyPr wrap="none" rtlCol="0">
+            <a:spAutoFit/>
+          </a:bodyPr>
+          <a:lstStyle/>
+          <a:p>
+            <a:r>
+              <a:rPr lang="en-US" sz="1400" dirty="0" err="1"/>
+              <a:t>MeasureReport</a:t>
+            </a:r>
+            <a:endParaRPr lang="en-US" sz="1400" dirty="0"/>
+          </a:p>
+        </p:txBody>
+      </p:sp>
+      <p:cxnSp>
+        <p:nvCxnSpPr>
+          <p:cNvPr id="23" name="Straight Arrow Connector 22">
+            <a:extLst>
+              <a:ext uri="{FF2B5EF4-FFF2-40B4-BE49-F238E27FC236}">
+                <a16:creationId xmlns:a16="http://schemas.microsoft.com/office/drawing/2014/main" id="{2DD6A23D-D179-57E6-1AA2-9D1D5B2841E4}"/>
+              </a:ext>
+            </a:extLst>
+          </p:cNvPr>
+          <p:cNvCxnSpPr>
+            <a:cxnSpLocks/>
+            <a:stCxn id="22" idx="1"/>
+            <a:endCxn id="9" idx="3"/>
+          </p:cNvCxnSpPr>
+          <p:nvPr/>
+        </p:nvCxnSpPr>
+        <p:spPr>
+          <a:xfrm flipH="1">
+            <a:off x="6490642" y="4106038"/>
+            <a:ext cx="629978" cy="568532"/>
+          </a:xfrm>
+          <a:prstGeom prst="straightConnector1">
+            <a:avLst/>
+          </a:prstGeom>
+          <a:ln>
+            <a:tailEnd type="triangle"/>
+          </a:ln>
+        </p:spPr>
+        <p:style>
+          <a:lnRef idx="3">
+            <a:schemeClr val="accent1"/>
+          </a:lnRef>
+          <a:fillRef idx="0">
+            <a:schemeClr val="accent1"/>
+          </a:fillRef>
+          <a:effectRef idx="2">
+            <a:schemeClr val="accent1"/>
+          </a:effectRef>
+          <a:fontRef idx="minor">
+            <a:schemeClr val="tx1"/>
+          </a:fontRef>
+        </p:style>
+      </p:cxnSp>
+      <p:sp>
+        <p:nvSpPr>
+          <p:cNvPr id="28" name="Arrow: Right 27">
+            <a:extLst>
+              <a:ext uri="{FF2B5EF4-FFF2-40B4-BE49-F238E27FC236}">
+                <a16:creationId xmlns:a16="http://schemas.microsoft.com/office/drawing/2014/main" id="{9B6449AB-2D86-4BD4-25D0-E1775020076A}"/>
+              </a:ext>
+            </a:extLst>
+          </p:cNvPr>
+          <p:cNvSpPr/>
+          <p:nvPr/>
+        </p:nvSpPr>
+        <p:spPr>
+          <a:xfrm>
+            <a:off x="5829093" y="4972551"/>
+            <a:ext cx="978408" cy="242316"/>
+          </a:xfrm>
+          <a:prstGeom prst="rightArrow">
+            <a:avLst/>
+          </a:prstGeom>
+        </p:spPr>
+        <p:style>
+          <a:lnRef idx="2">
+            <a:schemeClr val="accent1">
+              <a:shade val="15000"/>
+            </a:schemeClr>
+          </a:lnRef>
+          <a:fillRef idx="1">
+            <a:schemeClr val="accent1"/>
+          </a:fillRef>
+          <a:effectRef idx="0">
+            <a:schemeClr val="accent1"/>
+          </a:effectRef>
+          <a:fontRef idx="minor">
+            <a:schemeClr val="lt1"/>
+          </a:fontRef>
+        </p:style>
+        <p:txBody>
+          <a:bodyPr rtlCol="0" anchor="ctr"/>
+          <a:lstStyle/>
+          <a:p>
+            <a:pPr algn="ctr"/>
+            <a:endParaRPr lang="en-US" sz="1400"/>
+          </a:p>
+        </p:txBody>
+      </p:sp>
+      <p:sp>
+        <p:nvSpPr>
+          <p:cNvPr id="48" name="Arrow: Down 47">
+            <a:extLst>
+              <a:ext uri="{FF2B5EF4-FFF2-40B4-BE49-F238E27FC236}">
+                <a16:creationId xmlns:a16="http://schemas.microsoft.com/office/drawing/2014/main" id="{1238D0C3-DAAF-1745-4C96-F1DDBC201139}"/>
+              </a:ext>
+            </a:extLst>
+          </p:cNvPr>
+          <p:cNvSpPr/>
+          <p:nvPr/>
+        </p:nvSpPr>
+        <p:spPr>
+          <a:xfrm>
+            <a:off x="4814046" y="2620176"/>
+            <a:ext cx="219605" cy="1604264"/>
+          </a:xfrm>
+          <a:prstGeom prst="downArrow">
+            <a:avLst/>
+          </a:prstGeom>
+        </p:spPr>
+        <p:style>
+          <a:lnRef idx="2">
+            <a:schemeClr val="accent1">
+              <a:shade val="15000"/>
+            </a:schemeClr>
+          </a:lnRef>
+          <a:fillRef idx="1">
+            <a:schemeClr val="accent1"/>
+          </a:fillRef>
+          <a:effectRef idx="0">
+            <a:schemeClr val="accent1"/>
+          </a:effectRef>
+          <a:fontRef idx="minor">
+            <a:schemeClr val="lt1"/>
+          </a:fontRef>
+        </p:style>
+        <p:txBody>
+          <a:bodyPr rtlCol="0" anchor="ctr"/>
+          <a:lstStyle/>
+          <a:p>
+            <a:pPr algn="ctr"/>
+            <a:endParaRPr lang="en-US" sz="1400"/>
+          </a:p>
+        </p:txBody>
+      </p:sp>
+      <p:sp>
+        <p:nvSpPr>
+          <p:cNvPr id="49" name="Arrow: Down 48">
+            <a:extLst>
+              <a:ext uri="{FF2B5EF4-FFF2-40B4-BE49-F238E27FC236}">
+                <a16:creationId xmlns:a16="http://schemas.microsoft.com/office/drawing/2014/main" id="{8D5FE82A-F970-4700-495F-E243EA30201B}"/>
+              </a:ext>
+            </a:extLst>
+          </p:cNvPr>
+          <p:cNvSpPr/>
+          <p:nvPr/>
+        </p:nvSpPr>
+        <p:spPr>
+          <a:xfrm>
+            <a:off x="4138191" y="3849025"/>
+            <a:ext cx="219605" cy="413011"/>
+          </a:xfrm>
+          <a:prstGeom prst="downArrow">
+            <a:avLst/>
+          </a:prstGeom>
+        </p:spPr>
+        <p:style>
+          <a:lnRef idx="2">
+            <a:schemeClr val="accent1">
+              <a:shade val="15000"/>
+            </a:schemeClr>
+          </a:lnRef>
+          <a:fillRef idx="1">
+            <a:schemeClr val="accent1"/>
+          </a:fillRef>
+          <a:effectRef idx="0">
+            <a:schemeClr val="accent1"/>
+          </a:effectRef>
+          <a:fontRef idx="minor">
+            <a:schemeClr val="lt1"/>
+          </a:fontRef>
+        </p:style>
+        <p:txBody>
+          <a:bodyPr rtlCol="0" anchor="ctr"/>
+          <a:lstStyle/>
+          <a:p>
+            <a:pPr algn="ctr"/>
+            <a:endParaRPr lang="en-US" sz="1400"/>
+          </a:p>
+        </p:txBody>
+      </p:sp>
+      <p:sp>
+        <p:nvSpPr>
+          <p:cNvPr id="16" name="Rectangle 15">
+            <a:extLst>
+              <a:ext uri="{FF2B5EF4-FFF2-40B4-BE49-F238E27FC236}">
+                <a16:creationId xmlns:a16="http://schemas.microsoft.com/office/drawing/2014/main" id="{226B7DF0-5F0B-3C70-2820-405461EFC76D}"/>
+              </a:ext>
+            </a:extLst>
+          </p:cNvPr>
+          <p:cNvSpPr/>
+          <p:nvPr/>
+        </p:nvSpPr>
+        <p:spPr>
+          <a:xfrm>
+            <a:off x="2652280" y="1313106"/>
+            <a:ext cx="3325555" cy="3008373"/>
+          </a:xfrm>
+          <a:prstGeom prst="rect">
+            <a:avLst/>
+          </a:prstGeom>
+          <a:noFill/>
+          <a:ln w="38100">
+            <a:prstDash val="sysDash"/>
+          </a:ln>
+        </p:spPr>
+        <p:style>
+          <a:lnRef idx="2">
+            <a:schemeClr val="accent1">
+              <a:shade val="15000"/>
+            </a:schemeClr>
+          </a:lnRef>
+          <a:fillRef idx="1">
+            <a:schemeClr val="accent1"/>
+          </a:fillRef>
+          <a:effectRef idx="0">
+            <a:schemeClr val="accent1"/>
+          </a:effectRef>
+          <a:fontRef idx="minor">
+            <a:schemeClr val="lt1"/>
+          </a:fontRef>
+        </p:style>
+        <p:txBody>
+          <a:bodyPr rtlCol="0" anchor="ctr"/>
+          <a:lstStyle/>
+          <a:p>
+            <a:pPr algn="ctr"/>
+            <a:endParaRPr lang="en-US" sz="1400"/>
+          </a:p>
+        </p:txBody>
+      </p:sp>
+      <p:sp>
+        <p:nvSpPr>
+          <p:cNvPr id="17" name="TextBox 16">
+            <a:extLst>
+              <a:ext uri="{FF2B5EF4-FFF2-40B4-BE49-F238E27FC236}">
+                <a16:creationId xmlns:a16="http://schemas.microsoft.com/office/drawing/2014/main" id="{8C6494D3-BCEB-28FD-5A7C-4729124C6C98}"/>
+              </a:ext>
+            </a:extLst>
+          </p:cNvPr>
+          <p:cNvSpPr txBox="1"/>
+          <p:nvPr/>
+        </p:nvSpPr>
+        <p:spPr>
+          <a:xfrm>
+            <a:off x="1029246" y="1836661"/>
+            <a:ext cx="1011815" cy="461665"/>
+          </a:xfrm>
+          <a:prstGeom prst="rect">
+            <a:avLst/>
+          </a:prstGeom>
+          <a:noFill/>
+        </p:spPr>
+        <p:txBody>
+          <a:bodyPr wrap="none" rtlCol="0">
+            <a:spAutoFit/>
+          </a:bodyPr>
+          <a:lstStyle/>
+          <a:p>
+            <a:r>
+              <a:rPr lang="en-US" sz="2400" b="1" dirty="0"/>
+              <a:t>QM IG</a:t>
+            </a:r>
+          </a:p>
+        </p:txBody>
+      </p:sp>
+      <p:cxnSp>
+        <p:nvCxnSpPr>
+          <p:cNvPr id="19" name="Straight Arrow Connector 18">
+            <a:extLst>
+              <a:ext uri="{FF2B5EF4-FFF2-40B4-BE49-F238E27FC236}">
+                <a16:creationId xmlns:a16="http://schemas.microsoft.com/office/drawing/2014/main" id="{A68DBF94-870D-B3E3-942C-B0BA43E20DE5}"/>
+              </a:ext>
+            </a:extLst>
+          </p:cNvPr>
+          <p:cNvCxnSpPr>
+            <a:cxnSpLocks/>
+          </p:cNvCxnSpPr>
+          <p:nvPr/>
+        </p:nvCxnSpPr>
+        <p:spPr>
+          <a:xfrm>
+            <a:off x="1998133" y="2085573"/>
+            <a:ext cx="612058" cy="0"/>
+          </a:xfrm>
+          <a:prstGeom prst="straightConnector1">
+            <a:avLst/>
+          </a:prstGeom>
+          <a:ln>
+            <a:tailEnd type="triangle"/>
+          </a:ln>
+        </p:spPr>
+        <p:style>
+          <a:lnRef idx="3">
+            <a:schemeClr val="accent1"/>
+          </a:lnRef>
+          <a:fillRef idx="0">
+            <a:schemeClr val="accent1"/>
+          </a:fillRef>
+          <a:effectRef idx="2">
+            <a:schemeClr val="accent1"/>
+          </a:effectRef>
+          <a:fontRef idx="minor">
+            <a:schemeClr val="tx1"/>
+          </a:fontRef>
+        </p:style>
+      </p:cxnSp>
+      <p:sp>
+        <p:nvSpPr>
+          <p:cNvPr id="21" name="Rectangle 20">
+            <a:extLst>
+              <a:ext uri="{FF2B5EF4-FFF2-40B4-BE49-F238E27FC236}">
+                <a16:creationId xmlns:a16="http://schemas.microsoft.com/office/drawing/2014/main" id="{076F5035-DC11-CE6C-3770-AAAC5BFE548A}"/>
+              </a:ext>
+            </a:extLst>
+          </p:cNvPr>
+          <p:cNvSpPr/>
+          <p:nvPr/>
+        </p:nvSpPr>
+        <p:spPr>
+          <a:xfrm>
+            <a:off x="3752799" y="3955949"/>
+            <a:ext cx="5397623" cy="1683415"/>
+          </a:xfrm>
+          <a:prstGeom prst="rect">
+            <a:avLst/>
+          </a:prstGeom>
+          <a:noFill/>
+          <a:ln w="38100">
+            <a:prstDash val="sysDash"/>
+          </a:ln>
+        </p:spPr>
+        <p:style>
+          <a:lnRef idx="2">
+            <a:schemeClr val="accent1">
+              <a:shade val="15000"/>
+            </a:schemeClr>
+          </a:lnRef>
+          <a:fillRef idx="1">
+            <a:schemeClr val="accent1"/>
+          </a:fillRef>
+          <a:effectRef idx="0">
+            <a:schemeClr val="accent1"/>
+          </a:effectRef>
+          <a:fontRef idx="minor">
+            <a:schemeClr val="lt1"/>
+          </a:fontRef>
+        </p:style>
+        <p:txBody>
+          <a:bodyPr rtlCol="0" anchor="ctr"/>
+          <a:lstStyle/>
+          <a:p>
+            <a:pPr algn="ctr"/>
+            <a:endParaRPr lang="en-US" sz="1400"/>
+          </a:p>
+        </p:txBody>
+      </p:sp>
+      <p:sp>
+        <p:nvSpPr>
+          <p:cNvPr id="24" name="TextBox 23">
+            <a:extLst>
+              <a:ext uri="{FF2B5EF4-FFF2-40B4-BE49-F238E27FC236}">
+                <a16:creationId xmlns:a16="http://schemas.microsoft.com/office/drawing/2014/main" id="{EC01A6E1-5A4A-F9C7-34AD-54B576FEDC60}"/>
+              </a:ext>
+            </a:extLst>
+          </p:cNvPr>
+          <p:cNvSpPr txBox="1"/>
+          <p:nvPr/>
+        </p:nvSpPr>
+        <p:spPr>
+          <a:xfrm>
+            <a:off x="9747993" y="4706758"/>
+            <a:ext cx="1351204" cy="461665"/>
+          </a:xfrm>
+          <a:prstGeom prst="rect">
+            <a:avLst/>
+          </a:prstGeom>
+          <a:noFill/>
+        </p:spPr>
+        <p:txBody>
+          <a:bodyPr wrap="none" rtlCol="0">
+            <a:spAutoFit/>
+          </a:bodyPr>
+          <a:lstStyle/>
+          <a:p>
+            <a:r>
+              <a:rPr lang="en-US" sz="2400" b="1" dirty="0"/>
+              <a:t>DEQM IG</a:t>
+            </a:r>
+          </a:p>
+        </p:txBody>
+      </p:sp>
+      <p:cxnSp>
+        <p:nvCxnSpPr>
+          <p:cNvPr id="25" name="Straight Arrow Connector 24">
+            <a:extLst>
+              <a:ext uri="{FF2B5EF4-FFF2-40B4-BE49-F238E27FC236}">
+                <a16:creationId xmlns:a16="http://schemas.microsoft.com/office/drawing/2014/main" id="{E51D8341-17B5-7FDF-7970-F7E42EDAF678}"/>
+              </a:ext>
+            </a:extLst>
+          </p:cNvPr>
+          <p:cNvCxnSpPr>
+            <a:cxnSpLocks/>
+          </p:cNvCxnSpPr>
+          <p:nvPr/>
+        </p:nvCxnSpPr>
+        <p:spPr>
+          <a:xfrm flipH="1">
+            <a:off x="9225620" y="4972551"/>
+            <a:ext cx="582167" cy="0"/>
+          </a:xfrm>
+          <a:prstGeom prst="straightConnector1">
+            <a:avLst/>
+          </a:prstGeom>
+          <a:ln>
+            <a:tailEnd type="triangle"/>
+          </a:ln>
+        </p:spPr>
+        <p:style>
+          <a:lnRef idx="3">
+            <a:schemeClr val="accent1"/>
+          </a:lnRef>
+          <a:fillRef idx="0">
+            <a:schemeClr val="accent1"/>
+          </a:fillRef>
+          <a:effectRef idx="2">
+            <a:schemeClr val="accent1"/>
+          </a:effectRef>
+          <a:fontRef idx="minor">
+            <a:schemeClr val="tx1"/>
+          </a:fontRef>
+        </p:style>
+      </p:cxnSp>
+      <p:pic>
+        <p:nvPicPr>
+          <p:cNvPr id="11" name="Picture 10">
+            <a:extLst>
+              <a:ext uri="{FF2B5EF4-FFF2-40B4-BE49-F238E27FC236}">
+                <a16:creationId xmlns:a16="http://schemas.microsoft.com/office/drawing/2014/main" id="{C5BA84D2-B2CE-9B9D-F470-3371C8BAFFE0}"/>
+              </a:ext>
+            </a:extLst>
+          </p:cNvPr>
+          <p:cNvPicPr>
+            <a:picLocks noChangeAspect="1"/>
+          </p:cNvPicPr>
+          <p:nvPr/>
+        </p:nvPicPr>
+        <p:blipFill>
+          <a:blip r:embed="rId2">
+            <a:extLst>
+              <a:ext uri="{28A0092B-C50C-407E-A947-70E740481C1C}">
+                <a14:useLocalDpi xmlns:a14="http://schemas.microsoft.com/office/drawing/2010/main" val="0"/>
+              </a:ext>
+            </a:extLst>
+          </a:blip>
+          <a:stretch>
+            <a:fillRect/>
+          </a:stretch>
+        </p:blipFill>
+        <p:spPr>
+          <a:xfrm>
+            <a:off x="0" y="6563032"/>
+            <a:ext cx="1128965" cy="211681"/>
+          </a:xfrm>
+          <a:prstGeom prst="rect">
+            <a:avLst/>
+          </a:prstGeom>
+        </p:spPr>
+      </p:pic>
+      <p:sp>
+        <p:nvSpPr>
+          <p:cNvPr id="20" name="Arrow: Down 19">
+            <a:extLst>
+              <a:ext uri="{FF2B5EF4-FFF2-40B4-BE49-F238E27FC236}">
+                <a16:creationId xmlns:a16="http://schemas.microsoft.com/office/drawing/2014/main" id="{95AA1FB7-85AB-6855-7278-70480AE68DB4}"/>
+              </a:ext>
+            </a:extLst>
+          </p:cNvPr>
+          <p:cNvSpPr/>
+          <p:nvPr/>
+        </p:nvSpPr>
+        <p:spPr>
+          <a:xfrm rot="5400000">
+            <a:off x="5651536" y="1557074"/>
+            <a:ext cx="181814" cy="768042"/>
+          </a:xfrm>
+          <a:prstGeom prst="downArrow">
+            <a:avLst/>
+          </a:prstGeom>
+        </p:spPr>
+        <p:style>
+          <a:lnRef idx="2">
+            <a:schemeClr val="accent1">
+              <a:shade val="15000"/>
+            </a:schemeClr>
+          </a:lnRef>
+          <a:fillRef idx="1">
+            <a:schemeClr val="accent1"/>
+          </a:fillRef>
+          <a:effectRef idx="0">
+            <a:schemeClr val="accent1"/>
+          </a:effectRef>
+          <a:fontRef idx="minor">
+            <a:schemeClr val="lt1"/>
+          </a:fontRef>
+        </p:style>
+        <p:txBody>
+          <a:bodyPr rtlCol="0" anchor="ctr"/>
+          <a:lstStyle/>
+          <a:p>
+            <a:pPr algn="ctr"/>
+            <a:endParaRPr lang="en-US" sz="1400"/>
+          </a:p>
+        </p:txBody>
+      </p:sp>
+    </p:spTree>
+    <p:extLst>
+      <p:ext uri="{BB962C8B-B14F-4D97-AF65-F5344CB8AC3E}">
+        <p14:creationId xmlns:p14="http://schemas.microsoft.com/office/powerpoint/2010/main" val="3135552341"/>
+      </p:ext>
+    </p:extLst>
+  </p:cSld>
+  <p:clrMapOvr>
+    <a:masterClrMapping/>
+  </p:clrMapOvr>
+</p:sld>
+</file>
+
+<file path=ppt/slides/slide6.xml><?xml version="1.0" encoding="utf-8"?>
+<p:sld xmlns:a="http://schemas.openxmlformats.org/drawingml/2006/main" xmlns:r="http://schemas.openxmlformats.org/officeDocument/2006/relationships" xmlns:p="http://schemas.openxmlformats.org/presentationml/2006/main">
+  <p:cSld>
+    <p:spTree>
+      <p:nvGrpSpPr>
+        <p:cNvPr id="1" name=""/>
+        <p:cNvGrpSpPr/>
+        <p:nvPr/>
+      </p:nvGrpSpPr>
+      <p:grpSpPr>
+        <a:xfrm>
+          <a:off x="0" y="0"/>
+          <a:ext cx="0" cy="0"/>
+          <a:chOff x="0" y="0"/>
+          <a:chExt cx="0" cy="0"/>
+        </a:xfrm>
+      </p:grpSpPr>
+      <p:sp>
+        <p:nvSpPr>
+          <p:cNvPr id="2" name="Title 1">
+            <a:extLst>
+              <a:ext uri="{FF2B5EF4-FFF2-40B4-BE49-F238E27FC236}">
+                <a16:creationId xmlns:a16="http://schemas.microsoft.com/office/drawing/2014/main" id="{3A39628E-8C1B-B0F5-025E-CE2EAF14E2C7}"/>
+              </a:ext>
+            </a:extLst>
+          </p:cNvPr>
+          <p:cNvSpPr>
+            <a:spLocks noGrp="1"/>
+          </p:cNvSpPr>
+          <p:nvPr>
+            <p:ph type="title"/>
+          </p:nvPr>
+        </p:nvSpPr>
+        <p:spPr/>
+        <p:txBody>
+          <a:bodyPr/>
+          <a:lstStyle/>
+          <a:p>
+            <a:r>
+              <a:rPr lang="en-US" dirty="0"/>
+              <a:t>Population Reporting, no supporting data</a:t>
+            </a:r>
+          </a:p>
+        </p:txBody>
+      </p:sp>
+      <p:sp>
+        <p:nvSpPr>
+          <p:cNvPr id="4" name="Rectangle 3">
+            <a:extLst>
+              <a:ext uri="{FF2B5EF4-FFF2-40B4-BE49-F238E27FC236}">
+                <a16:creationId xmlns:a16="http://schemas.microsoft.com/office/drawing/2014/main" id="{913576AC-EB06-EA3B-0F01-40250E5FD773}"/>
+              </a:ext>
+            </a:extLst>
+          </p:cNvPr>
+          <p:cNvSpPr/>
+          <p:nvPr/>
+        </p:nvSpPr>
+        <p:spPr>
+          <a:xfrm>
+            <a:off x="2553548" y="2472276"/>
+            <a:ext cx="1469813" cy="853440"/>
+          </a:xfrm>
+          <a:prstGeom prst="rect">
+            <a:avLst/>
+          </a:prstGeom>
+        </p:spPr>
+        <p:style>
+          <a:lnRef idx="2">
+            <a:schemeClr val="accent1">
+              <a:shade val="15000"/>
+            </a:schemeClr>
+          </a:lnRef>
+          <a:fillRef idx="1">
+            <a:schemeClr val="accent1"/>
+          </a:fillRef>
+          <a:effectRef idx="0">
+            <a:schemeClr val="accent1"/>
+          </a:effectRef>
+          <a:fontRef idx="minor">
+            <a:schemeClr val="lt1"/>
+          </a:fontRef>
+        </p:style>
+        <p:txBody>
+          <a:bodyPr rtlCol="0" anchor="ctr"/>
+          <a:lstStyle/>
+          <a:p>
+            <a:pPr algn="ctr"/>
+            <a:r>
+              <a:rPr lang="en-US" dirty="0"/>
+              <a:t>Clinical Data Repository</a:t>
+            </a:r>
+          </a:p>
+        </p:txBody>
+      </p:sp>
+      <p:sp>
+        <p:nvSpPr>
+          <p:cNvPr id="6" name="Rectangle 5">
+            <a:extLst>
+              <a:ext uri="{FF2B5EF4-FFF2-40B4-BE49-F238E27FC236}">
+                <a16:creationId xmlns:a16="http://schemas.microsoft.com/office/drawing/2014/main" id="{65B10B82-6CCF-91E5-5AF9-8196AE54A992}"/>
+              </a:ext>
+            </a:extLst>
+          </p:cNvPr>
+          <p:cNvSpPr/>
+          <p:nvPr/>
+        </p:nvSpPr>
+        <p:spPr>
+          <a:xfrm>
+            <a:off x="4986867" y="2472276"/>
+            <a:ext cx="1469813" cy="853440"/>
+          </a:xfrm>
+          <a:prstGeom prst="rect">
+            <a:avLst/>
+          </a:prstGeom>
+        </p:spPr>
+        <p:style>
+          <a:lnRef idx="2">
+            <a:schemeClr val="accent1">
+              <a:shade val="15000"/>
+            </a:schemeClr>
+          </a:lnRef>
+          <a:fillRef idx="1">
+            <a:schemeClr val="accent1"/>
+          </a:fillRef>
+          <a:effectRef idx="0">
+            <a:schemeClr val="accent1"/>
+          </a:effectRef>
+          <a:fontRef idx="minor">
+            <a:schemeClr val="lt1"/>
+          </a:fontRef>
+        </p:style>
+        <p:txBody>
+          <a:bodyPr rtlCol="0" anchor="ctr"/>
+          <a:lstStyle/>
+          <a:p>
+            <a:pPr algn="ctr"/>
+            <a:r>
+              <a:rPr lang="en-US" dirty="0"/>
+              <a:t>Measure Evaluation Service</a:t>
+            </a:r>
+          </a:p>
+        </p:txBody>
+      </p:sp>
+      <p:sp>
+        <p:nvSpPr>
+          <p:cNvPr id="7" name="Rectangle 6">
+            <a:extLst>
+              <a:ext uri="{FF2B5EF4-FFF2-40B4-BE49-F238E27FC236}">
+                <a16:creationId xmlns:a16="http://schemas.microsoft.com/office/drawing/2014/main" id="{7F3CE74F-D3B8-6E48-1DA9-A1779E9D948B}"/>
+              </a:ext>
+            </a:extLst>
+          </p:cNvPr>
+          <p:cNvSpPr/>
+          <p:nvPr/>
+        </p:nvSpPr>
+        <p:spPr>
+          <a:xfrm>
+            <a:off x="7420187" y="2472276"/>
+            <a:ext cx="1469813" cy="853440"/>
+          </a:xfrm>
+          <a:prstGeom prst="rect">
+            <a:avLst/>
+          </a:prstGeom>
+        </p:spPr>
+        <p:style>
+          <a:lnRef idx="2">
+            <a:schemeClr val="accent1">
+              <a:shade val="15000"/>
+            </a:schemeClr>
+          </a:lnRef>
+          <a:fillRef idx="1">
+            <a:schemeClr val="accent1"/>
+          </a:fillRef>
+          <a:effectRef idx="0">
+            <a:schemeClr val="accent1"/>
+          </a:effectRef>
+          <a:fontRef idx="minor">
+            <a:schemeClr val="lt1"/>
+          </a:fontRef>
+        </p:style>
+        <p:txBody>
+          <a:bodyPr rtlCol="0" anchor="ctr"/>
+          <a:lstStyle/>
+          <a:p>
+            <a:pPr algn="ctr"/>
+            <a:r>
+              <a:rPr lang="en-US" dirty="0"/>
+              <a:t>Receiving System</a:t>
+            </a:r>
+          </a:p>
+        </p:txBody>
+      </p:sp>
+      <p:sp>
+        <p:nvSpPr>
+          <p:cNvPr id="10" name="Arrow: Right 9">
+            <a:extLst>
+              <a:ext uri="{FF2B5EF4-FFF2-40B4-BE49-F238E27FC236}">
+                <a16:creationId xmlns:a16="http://schemas.microsoft.com/office/drawing/2014/main" id="{0C5FD330-95FC-79E7-A1E3-119485D06ACA}"/>
+              </a:ext>
+            </a:extLst>
+          </p:cNvPr>
+          <p:cNvSpPr/>
+          <p:nvPr/>
+        </p:nvSpPr>
+        <p:spPr>
+          <a:xfrm rot="10800000">
+            <a:off x="4112260" y="2641599"/>
+            <a:ext cx="785707" cy="209974"/>
+          </a:xfrm>
+          <a:prstGeom prst="rightArrow">
+            <a:avLst/>
+          </a:prstGeom>
+        </p:spPr>
+        <p:style>
+          <a:lnRef idx="2">
+            <a:schemeClr val="accent1">
+              <a:shade val="15000"/>
+            </a:schemeClr>
+          </a:lnRef>
+          <a:fillRef idx="1">
+            <a:schemeClr val="accent1"/>
+          </a:fillRef>
+          <a:effectRef idx="0">
+            <a:schemeClr val="accent1"/>
+          </a:effectRef>
+          <a:fontRef idx="minor">
+            <a:schemeClr val="lt1"/>
+          </a:fontRef>
+        </p:style>
+        <p:txBody>
+          <a:bodyPr rtlCol="0" anchor="ctr"/>
+          <a:lstStyle/>
+          <a:p>
+            <a:pPr algn="ctr"/>
+            <a:endParaRPr lang="en-US"/>
+          </a:p>
+        </p:txBody>
+      </p:sp>
+      <p:sp>
+        <p:nvSpPr>
+          <p:cNvPr id="11" name="Arrow: Right 10">
+            <a:extLst>
+              <a:ext uri="{FF2B5EF4-FFF2-40B4-BE49-F238E27FC236}">
+                <a16:creationId xmlns:a16="http://schemas.microsoft.com/office/drawing/2014/main" id="{D2F3829E-702D-14B7-51DD-54D367C8E039}"/>
+              </a:ext>
+            </a:extLst>
+          </p:cNvPr>
+          <p:cNvSpPr/>
+          <p:nvPr/>
+        </p:nvSpPr>
+        <p:spPr>
+          <a:xfrm>
+            <a:off x="4112260" y="2905779"/>
+            <a:ext cx="785707" cy="209974"/>
+          </a:xfrm>
+          <a:prstGeom prst="rightArrow">
+            <a:avLst/>
+          </a:prstGeom>
+        </p:spPr>
+        <p:style>
+          <a:lnRef idx="2">
+            <a:schemeClr val="accent1">
+              <a:shade val="15000"/>
+            </a:schemeClr>
+          </a:lnRef>
+          <a:fillRef idx="1">
+            <a:schemeClr val="accent1"/>
+          </a:fillRef>
+          <a:effectRef idx="0">
+            <a:schemeClr val="accent1"/>
+          </a:effectRef>
+          <a:fontRef idx="minor">
+            <a:schemeClr val="lt1"/>
+          </a:fontRef>
+        </p:style>
+        <p:txBody>
+          <a:bodyPr rtlCol="0" anchor="ctr"/>
+          <a:lstStyle/>
+          <a:p>
+            <a:pPr algn="ctr"/>
+            <a:endParaRPr lang="en-US"/>
+          </a:p>
+        </p:txBody>
+      </p:sp>
+      <p:sp>
+        <p:nvSpPr>
+          <p:cNvPr id="12" name="Arrow: Right 11">
+            <a:extLst>
+              <a:ext uri="{FF2B5EF4-FFF2-40B4-BE49-F238E27FC236}">
+                <a16:creationId xmlns:a16="http://schemas.microsoft.com/office/drawing/2014/main" id="{646EA04C-8293-4455-9787-DEF164FDFBDA}"/>
+              </a:ext>
+            </a:extLst>
+          </p:cNvPr>
+          <p:cNvSpPr/>
+          <p:nvPr/>
+        </p:nvSpPr>
+        <p:spPr>
+          <a:xfrm>
+            <a:off x="6546426" y="2760172"/>
+            <a:ext cx="785707" cy="209974"/>
+          </a:xfrm>
+          <a:prstGeom prst="rightArrow">
+            <a:avLst/>
+          </a:prstGeom>
+        </p:spPr>
+        <p:style>
+          <a:lnRef idx="2">
+            <a:schemeClr val="accent1">
+              <a:shade val="15000"/>
+            </a:schemeClr>
+          </a:lnRef>
+          <a:fillRef idx="1">
+            <a:schemeClr val="accent1"/>
+          </a:fillRef>
+          <a:effectRef idx="0">
+            <a:schemeClr val="accent1"/>
+          </a:effectRef>
+          <a:fontRef idx="minor">
+            <a:schemeClr val="lt1"/>
+          </a:fontRef>
+        </p:style>
+        <p:txBody>
+          <a:bodyPr rtlCol="0" anchor="ctr"/>
+          <a:lstStyle/>
+          <a:p>
+            <a:pPr algn="ctr"/>
+            <a:endParaRPr lang="en-US"/>
+          </a:p>
+        </p:txBody>
+      </p:sp>
+      <p:sp>
+        <p:nvSpPr>
+          <p:cNvPr id="18" name="Flowchart: Document 17">
+            <a:extLst>
+              <a:ext uri="{FF2B5EF4-FFF2-40B4-BE49-F238E27FC236}">
+                <a16:creationId xmlns:a16="http://schemas.microsoft.com/office/drawing/2014/main" id="{33C6C887-23C2-E0DD-6522-219EED8FB95D}"/>
+              </a:ext>
+            </a:extLst>
+          </p:cNvPr>
+          <p:cNvSpPr/>
+          <p:nvPr/>
+        </p:nvSpPr>
+        <p:spPr>
+          <a:xfrm>
+            <a:off x="6756345" y="3137194"/>
+            <a:ext cx="364177" cy="377043"/>
+          </a:xfrm>
+          <a:prstGeom prst="flowChartDocument">
+            <a:avLst/>
+          </a:prstGeom>
+          <a:solidFill>
+            <a:schemeClr val="accent6"/>
+          </a:solidFill>
+        </p:spPr>
+        <p:style>
+          <a:lnRef idx="2">
+            <a:schemeClr val="accent1">
+              <a:shade val="50000"/>
+            </a:schemeClr>
+          </a:lnRef>
+          <a:fillRef idx="1">
+            <a:schemeClr val="accent1"/>
+          </a:fillRef>
+          <a:effectRef idx="0">
+            <a:schemeClr val="accent1"/>
+          </a:effectRef>
+          <a:fontRef idx="minor">
+            <a:schemeClr val="lt1"/>
+          </a:fontRef>
+        </p:style>
+        <p:txBody>
+          <a:bodyPr rtlCol="0" anchor="ctr"/>
+          <a:lstStyle/>
+          <a:p>
+            <a:pPr algn="ctr"/>
+            <a:endParaRPr lang="en-US" sz="1400"/>
+          </a:p>
+        </p:txBody>
+      </p:sp>
+      <p:sp>
+        <p:nvSpPr>
+          <p:cNvPr id="19" name="Flowchart: Document 18">
+            <a:extLst>
+              <a:ext uri="{FF2B5EF4-FFF2-40B4-BE49-F238E27FC236}">
+                <a16:creationId xmlns:a16="http://schemas.microsoft.com/office/drawing/2014/main" id="{B2B37CA2-8696-7912-B43F-B1A3DE903F4A}"/>
+              </a:ext>
+            </a:extLst>
+          </p:cNvPr>
+          <p:cNvSpPr/>
+          <p:nvPr/>
+        </p:nvSpPr>
+        <p:spPr>
+          <a:xfrm>
+            <a:off x="4140936" y="3169959"/>
+            <a:ext cx="364177" cy="377043"/>
+          </a:xfrm>
+          <a:prstGeom prst="flowChartDocument">
+            <a:avLst/>
+          </a:prstGeom>
+          <a:solidFill>
+            <a:schemeClr val="accent6"/>
+          </a:solidFill>
+        </p:spPr>
+        <p:style>
+          <a:lnRef idx="2">
+            <a:schemeClr val="accent1">
+              <a:shade val="50000"/>
+            </a:schemeClr>
+          </a:lnRef>
+          <a:fillRef idx="1">
+            <a:schemeClr val="accent1"/>
+          </a:fillRef>
+          <a:effectRef idx="0">
+            <a:schemeClr val="accent1"/>
+          </a:effectRef>
+          <a:fontRef idx="minor">
+            <a:schemeClr val="lt1"/>
+          </a:fontRef>
+        </p:style>
+        <p:txBody>
+          <a:bodyPr rtlCol="0" anchor="ctr"/>
+          <a:lstStyle/>
+          <a:p>
+            <a:pPr algn="ctr"/>
+            <a:endParaRPr lang="en-US" sz="1400"/>
+          </a:p>
+        </p:txBody>
+      </p:sp>
+      <p:sp>
+        <p:nvSpPr>
+          <p:cNvPr id="20" name="Flowchart: Document 19">
+            <a:extLst>
+              <a:ext uri="{FF2B5EF4-FFF2-40B4-BE49-F238E27FC236}">
+                <a16:creationId xmlns:a16="http://schemas.microsoft.com/office/drawing/2014/main" id="{BC7275AA-B386-A0BA-5BE8-3E2330CE5B89}"/>
+              </a:ext>
+            </a:extLst>
+          </p:cNvPr>
+          <p:cNvSpPr/>
+          <p:nvPr/>
+        </p:nvSpPr>
+        <p:spPr>
+          <a:xfrm>
+            <a:off x="4255803" y="3289594"/>
+            <a:ext cx="364177" cy="377043"/>
+          </a:xfrm>
+          <a:prstGeom prst="flowChartDocument">
+            <a:avLst/>
+          </a:prstGeom>
+          <a:solidFill>
+            <a:schemeClr val="accent6"/>
+          </a:solidFill>
+        </p:spPr>
+        <p:style>
+          <a:lnRef idx="2">
+            <a:schemeClr val="accent1">
+              <a:shade val="50000"/>
+            </a:schemeClr>
+          </a:lnRef>
+          <a:fillRef idx="1">
+            <a:schemeClr val="accent1"/>
+          </a:fillRef>
+          <a:effectRef idx="0">
+            <a:schemeClr val="accent1"/>
+          </a:effectRef>
+          <a:fontRef idx="minor">
+            <a:schemeClr val="lt1"/>
+          </a:fontRef>
+        </p:style>
+        <p:txBody>
+          <a:bodyPr rtlCol="0" anchor="ctr"/>
+          <a:lstStyle/>
+          <a:p>
+            <a:pPr algn="ctr"/>
+            <a:endParaRPr lang="en-US" sz="1400"/>
+          </a:p>
+        </p:txBody>
+      </p:sp>
+      <p:sp>
+        <p:nvSpPr>
+          <p:cNvPr id="21" name="Flowchart: Document 20">
+            <a:extLst>
+              <a:ext uri="{FF2B5EF4-FFF2-40B4-BE49-F238E27FC236}">
+                <a16:creationId xmlns:a16="http://schemas.microsoft.com/office/drawing/2014/main" id="{5F3F4FCB-4735-C441-A138-01D1E717855F}"/>
+              </a:ext>
+            </a:extLst>
+          </p:cNvPr>
+          <p:cNvSpPr/>
+          <p:nvPr/>
+        </p:nvSpPr>
+        <p:spPr>
+          <a:xfrm>
+            <a:off x="4395753" y="3409229"/>
+            <a:ext cx="364177" cy="377043"/>
+          </a:xfrm>
+          <a:prstGeom prst="flowChartDocument">
+            <a:avLst/>
+          </a:prstGeom>
+          <a:solidFill>
+            <a:schemeClr val="accent6"/>
+          </a:solidFill>
+        </p:spPr>
+        <p:style>
+          <a:lnRef idx="2">
+            <a:schemeClr val="accent1">
+              <a:shade val="50000"/>
+            </a:schemeClr>
+          </a:lnRef>
+          <a:fillRef idx="1">
+            <a:schemeClr val="accent1"/>
+          </a:fillRef>
+          <a:effectRef idx="0">
+            <a:schemeClr val="accent1"/>
+          </a:effectRef>
+          <a:fontRef idx="minor">
+            <a:schemeClr val="lt1"/>
+          </a:fontRef>
+        </p:style>
+        <p:txBody>
+          <a:bodyPr rtlCol="0" anchor="ctr"/>
+          <a:lstStyle/>
+          <a:p>
+            <a:pPr algn="ctr"/>
+            <a:endParaRPr lang="en-US" sz="1400"/>
+          </a:p>
+        </p:txBody>
+      </p:sp>
+      <p:sp>
+        <p:nvSpPr>
+          <p:cNvPr id="22" name="Flowchart: Document 21">
+            <a:extLst>
+              <a:ext uri="{FF2B5EF4-FFF2-40B4-BE49-F238E27FC236}">
+                <a16:creationId xmlns:a16="http://schemas.microsoft.com/office/drawing/2014/main" id="{79510110-3B38-BDDB-2BCC-12F0517F3804}"/>
+              </a:ext>
+            </a:extLst>
+          </p:cNvPr>
+          <p:cNvSpPr/>
+          <p:nvPr/>
+        </p:nvSpPr>
+        <p:spPr>
+          <a:xfrm>
+            <a:off x="4526225" y="3547002"/>
+            <a:ext cx="364177" cy="377043"/>
+          </a:xfrm>
+          <a:prstGeom prst="flowChartDocument">
+            <a:avLst/>
+          </a:prstGeom>
+          <a:solidFill>
+            <a:schemeClr val="accent6"/>
+          </a:solidFill>
+        </p:spPr>
+        <p:style>
+          <a:lnRef idx="2">
+            <a:schemeClr val="accent1">
+              <a:shade val="50000"/>
+            </a:schemeClr>
+          </a:lnRef>
+          <a:fillRef idx="1">
+            <a:schemeClr val="accent1"/>
+          </a:fillRef>
+          <a:effectRef idx="0">
+            <a:schemeClr val="accent1"/>
+          </a:effectRef>
+          <a:fontRef idx="minor">
+            <a:schemeClr val="lt1"/>
+          </a:fontRef>
+        </p:style>
+        <p:txBody>
+          <a:bodyPr rtlCol="0" anchor="ctr"/>
+          <a:lstStyle/>
+          <a:p>
+            <a:pPr algn="ctr"/>
+            <a:endParaRPr lang="en-US" sz="1400"/>
+          </a:p>
+        </p:txBody>
+      </p:sp>
+      <p:sp>
+        <p:nvSpPr>
+          <p:cNvPr id="25" name="TextBox 24">
+            <a:extLst>
+              <a:ext uri="{FF2B5EF4-FFF2-40B4-BE49-F238E27FC236}">
+                <a16:creationId xmlns:a16="http://schemas.microsoft.com/office/drawing/2014/main" id="{B1D500FB-FF33-119E-A913-3DC22B47D254}"/>
+              </a:ext>
+            </a:extLst>
+          </p:cNvPr>
+          <p:cNvSpPr txBox="1"/>
+          <p:nvPr/>
+        </p:nvSpPr>
+        <p:spPr>
+          <a:xfrm>
+            <a:off x="3729286" y="3973763"/>
+            <a:ext cx="1781387" cy="430887"/>
+          </a:xfrm>
+          <a:prstGeom prst="rect">
+            <a:avLst/>
+          </a:prstGeom>
+          <a:noFill/>
+        </p:spPr>
+        <p:txBody>
+          <a:bodyPr wrap="square" rtlCol="0">
+            <a:spAutoFit/>
+          </a:bodyPr>
+          <a:lstStyle/>
+          <a:p>
+            <a:pPr algn="ctr"/>
+            <a:r>
+              <a:rPr lang="en-US" sz="1100" dirty="0"/>
+              <a:t>FHIR API queries to retrieve patient Bundles</a:t>
+            </a:r>
+          </a:p>
+        </p:txBody>
+      </p:sp>
+      <p:sp>
+        <p:nvSpPr>
+          <p:cNvPr id="26" name="TextBox 25">
+            <a:extLst>
+              <a:ext uri="{FF2B5EF4-FFF2-40B4-BE49-F238E27FC236}">
+                <a16:creationId xmlns:a16="http://schemas.microsoft.com/office/drawing/2014/main" id="{30F45A91-64C8-FF7F-9680-FF154C5FB5C9}"/>
+              </a:ext>
+            </a:extLst>
+          </p:cNvPr>
+          <p:cNvSpPr txBox="1"/>
+          <p:nvPr/>
+        </p:nvSpPr>
+        <p:spPr>
+          <a:xfrm>
+            <a:off x="6047739" y="3973763"/>
+            <a:ext cx="1781387" cy="430887"/>
+          </a:xfrm>
+          <a:prstGeom prst="rect">
+            <a:avLst/>
+          </a:prstGeom>
+          <a:noFill/>
+        </p:spPr>
+        <p:txBody>
+          <a:bodyPr wrap="square" rtlCol="0">
+            <a:spAutoFit/>
+          </a:bodyPr>
+          <a:lstStyle/>
+          <a:p>
+            <a:pPr algn="ctr"/>
+            <a:r>
+              <a:rPr lang="en-US" sz="1100" dirty="0"/>
+              <a:t>POST calculated </a:t>
+            </a:r>
+            <a:r>
+              <a:rPr lang="en-US" sz="1100" dirty="0" err="1"/>
+              <a:t>MeasureReport</a:t>
+            </a:r>
+            <a:endParaRPr lang="en-US" sz="1100" dirty="0"/>
+          </a:p>
+        </p:txBody>
+      </p:sp>
+    </p:spTree>
+    <p:extLst>
+      <p:ext uri="{BB962C8B-B14F-4D97-AF65-F5344CB8AC3E}">
+        <p14:creationId xmlns:p14="http://schemas.microsoft.com/office/powerpoint/2010/main" val="1018621779"/>
+      </p:ext>
+    </p:extLst>
+  </p:cSld>
+  <p:clrMapOvr>
+    <a:masterClrMapping/>
+  </p:clrMapOvr>
+</p:sld>
+</file>
+
+<file path=ppt/slides/slide7.xml><?xml version="1.0" encoding="utf-8"?>
+<p:sld xmlns:a="http://schemas.openxmlformats.org/drawingml/2006/main" xmlns:r="http://schemas.openxmlformats.org/officeDocument/2006/relationships" xmlns:p="http://schemas.openxmlformats.org/presentationml/2006/main">
+  <p:cSld>
+    <p:spTree>
+      <p:nvGrpSpPr>
+        <p:cNvPr id="1" name="">
+          <a:extLst>
+            <a:ext uri="{FF2B5EF4-FFF2-40B4-BE49-F238E27FC236}">
+              <a16:creationId xmlns:a16="http://schemas.microsoft.com/office/drawing/2014/main" id="{3EE994BF-4C10-415A-D6CF-C1BCB505DA48}"/>
+            </a:ext>
+          </a:extLst>
+        </p:cNvPr>
+        <p:cNvGrpSpPr/>
+        <p:nvPr/>
+      </p:nvGrpSpPr>
+      <p:grpSpPr>
+        <a:xfrm>
+          <a:off x="0" y="0"/>
+          <a:ext cx="0" cy="0"/>
+          <a:chOff x="0" y="0"/>
+          <a:chExt cx="0" cy="0"/>
+        </a:xfrm>
+      </p:grpSpPr>
+      <p:sp>
+        <p:nvSpPr>
+          <p:cNvPr id="2" name="Title 1">
+            <a:extLst>
+              <a:ext uri="{FF2B5EF4-FFF2-40B4-BE49-F238E27FC236}">
+                <a16:creationId xmlns:a16="http://schemas.microsoft.com/office/drawing/2014/main" id="{A613D8B0-7B6A-E14D-9F36-D9E6A911A37A}"/>
+              </a:ext>
+            </a:extLst>
+          </p:cNvPr>
+          <p:cNvSpPr>
+            <a:spLocks noGrp="1"/>
+          </p:cNvSpPr>
+          <p:nvPr>
+            <p:ph type="title"/>
+          </p:nvPr>
+        </p:nvSpPr>
+        <p:spPr/>
+        <p:txBody>
+          <a:bodyPr/>
+          <a:lstStyle/>
+          <a:p>
+            <a:r>
+              <a:rPr lang="en-US" dirty="0"/>
+              <a:t>Population Reporting, supporting data</a:t>
+            </a:r>
+          </a:p>
+        </p:txBody>
+      </p:sp>
+      <p:sp>
+        <p:nvSpPr>
+          <p:cNvPr id="4" name="Rectangle 3">
+            <a:extLst>
+              <a:ext uri="{FF2B5EF4-FFF2-40B4-BE49-F238E27FC236}">
+                <a16:creationId xmlns:a16="http://schemas.microsoft.com/office/drawing/2014/main" id="{2D010520-E26A-762D-CBEF-1EA3B822B638}"/>
+              </a:ext>
+            </a:extLst>
+          </p:cNvPr>
+          <p:cNvSpPr/>
+          <p:nvPr/>
+        </p:nvSpPr>
+        <p:spPr>
+          <a:xfrm>
+            <a:off x="2553548" y="2472276"/>
+            <a:ext cx="1469813" cy="853440"/>
+          </a:xfrm>
+          <a:prstGeom prst="rect">
+            <a:avLst/>
+          </a:prstGeom>
+        </p:spPr>
+        <p:style>
+          <a:lnRef idx="2">
+            <a:schemeClr val="accent1">
+              <a:shade val="15000"/>
+            </a:schemeClr>
+          </a:lnRef>
+          <a:fillRef idx="1">
+            <a:schemeClr val="accent1"/>
+          </a:fillRef>
+          <a:effectRef idx="0">
+            <a:schemeClr val="accent1"/>
+          </a:effectRef>
+          <a:fontRef idx="minor">
+            <a:schemeClr val="lt1"/>
+          </a:fontRef>
+        </p:style>
+        <p:txBody>
+          <a:bodyPr rtlCol="0" anchor="ctr"/>
+          <a:lstStyle/>
+          <a:p>
+            <a:pPr algn="ctr"/>
+            <a:r>
+              <a:rPr lang="en-US" dirty="0"/>
+              <a:t>Clinical Data Repository</a:t>
+            </a:r>
+          </a:p>
+        </p:txBody>
+      </p:sp>
+      <p:sp>
+        <p:nvSpPr>
+          <p:cNvPr id="6" name="Rectangle 5">
+            <a:extLst>
+              <a:ext uri="{FF2B5EF4-FFF2-40B4-BE49-F238E27FC236}">
+                <a16:creationId xmlns:a16="http://schemas.microsoft.com/office/drawing/2014/main" id="{03EBEFC9-8EF4-8ED5-C84E-C9AA97B57572}"/>
+              </a:ext>
+            </a:extLst>
+          </p:cNvPr>
+          <p:cNvSpPr/>
+          <p:nvPr/>
+        </p:nvSpPr>
+        <p:spPr>
+          <a:xfrm>
+            <a:off x="4986867" y="2472276"/>
+            <a:ext cx="1469813" cy="853440"/>
+          </a:xfrm>
+          <a:prstGeom prst="rect">
+            <a:avLst/>
+          </a:prstGeom>
+        </p:spPr>
+        <p:style>
+          <a:lnRef idx="2">
+            <a:schemeClr val="accent1">
+              <a:shade val="15000"/>
+            </a:schemeClr>
+          </a:lnRef>
+          <a:fillRef idx="1">
+            <a:schemeClr val="accent1"/>
+          </a:fillRef>
+          <a:effectRef idx="0">
+            <a:schemeClr val="accent1"/>
+          </a:effectRef>
+          <a:fontRef idx="minor">
+            <a:schemeClr val="lt1"/>
+          </a:fontRef>
+        </p:style>
+        <p:txBody>
+          <a:bodyPr rtlCol="0" anchor="ctr"/>
+          <a:lstStyle/>
+          <a:p>
+            <a:pPr algn="ctr"/>
+            <a:r>
+              <a:rPr lang="en-US" dirty="0"/>
+              <a:t>Measure Evaluation Service</a:t>
+            </a:r>
+          </a:p>
+        </p:txBody>
+      </p:sp>
+      <p:sp>
+        <p:nvSpPr>
+          <p:cNvPr id="7" name="Rectangle 6">
+            <a:extLst>
+              <a:ext uri="{FF2B5EF4-FFF2-40B4-BE49-F238E27FC236}">
+                <a16:creationId xmlns:a16="http://schemas.microsoft.com/office/drawing/2014/main" id="{17930B35-9235-C6CB-A4C2-2E28DB1EB837}"/>
+              </a:ext>
+            </a:extLst>
+          </p:cNvPr>
+          <p:cNvSpPr/>
+          <p:nvPr/>
+        </p:nvSpPr>
+        <p:spPr>
+          <a:xfrm>
+            <a:off x="7420187" y="2472276"/>
+            <a:ext cx="1469813" cy="853440"/>
+          </a:xfrm>
+          <a:prstGeom prst="rect">
+            <a:avLst/>
+          </a:prstGeom>
+        </p:spPr>
+        <p:style>
+          <a:lnRef idx="2">
+            <a:schemeClr val="accent1">
+              <a:shade val="15000"/>
+            </a:schemeClr>
+          </a:lnRef>
+          <a:fillRef idx="1">
+            <a:schemeClr val="accent1"/>
+          </a:fillRef>
+          <a:effectRef idx="0">
+            <a:schemeClr val="accent1"/>
+          </a:effectRef>
+          <a:fontRef idx="minor">
+            <a:schemeClr val="lt1"/>
+          </a:fontRef>
+        </p:style>
+        <p:txBody>
+          <a:bodyPr rtlCol="0" anchor="ctr"/>
+          <a:lstStyle/>
+          <a:p>
+            <a:pPr algn="ctr"/>
+            <a:r>
+              <a:rPr lang="en-US" dirty="0"/>
+              <a:t>Receiving System</a:t>
+            </a:r>
+          </a:p>
+        </p:txBody>
+      </p:sp>
+      <p:sp>
+        <p:nvSpPr>
+          <p:cNvPr id="10" name="Arrow: Right 9">
+            <a:extLst>
+              <a:ext uri="{FF2B5EF4-FFF2-40B4-BE49-F238E27FC236}">
+                <a16:creationId xmlns:a16="http://schemas.microsoft.com/office/drawing/2014/main" id="{2978EBB4-CDA8-71A1-4708-30B48692BC02}"/>
+              </a:ext>
+            </a:extLst>
+          </p:cNvPr>
+          <p:cNvSpPr/>
+          <p:nvPr/>
+        </p:nvSpPr>
+        <p:spPr>
+          <a:xfrm rot="10800000">
+            <a:off x="4112260" y="2641599"/>
+            <a:ext cx="785707" cy="209974"/>
+          </a:xfrm>
+          <a:prstGeom prst="rightArrow">
+            <a:avLst/>
+          </a:prstGeom>
+        </p:spPr>
+        <p:style>
+          <a:lnRef idx="2">
+            <a:schemeClr val="accent1">
+              <a:shade val="15000"/>
+            </a:schemeClr>
+          </a:lnRef>
+          <a:fillRef idx="1">
+            <a:schemeClr val="accent1"/>
+          </a:fillRef>
+          <a:effectRef idx="0">
+            <a:schemeClr val="accent1"/>
+          </a:effectRef>
+          <a:fontRef idx="minor">
+            <a:schemeClr val="lt1"/>
+          </a:fontRef>
+        </p:style>
+        <p:txBody>
+          <a:bodyPr rtlCol="0" anchor="ctr"/>
+          <a:lstStyle/>
+          <a:p>
+            <a:pPr algn="ctr"/>
+            <a:endParaRPr lang="en-US"/>
+          </a:p>
+        </p:txBody>
+      </p:sp>
+      <p:sp>
+        <p:nvSpPr>
+          <p:cNvPr id="11" name="Arrow: Right 10">
+            <a:extLst>
+              <a:ext uri="{FF2B5EF4-FFF2-40B4-BE49-F238E27FC236}">
+                <a16:creationId xmlns:a16="http://schemas.microsoft.com/office/drawing/2014/main" id="{46E8AE56-0A08-B198-32D7-F2D44F5C7300}"/>
+              </a:ext>
+            </a:extLst>
+          </p:cNvPr>
+          <p:cNvSpPr/>
+          <p:nvPr/>
+        </p:nvSpPr>
+        <p:spPr>
+          <a:xfrm>
+            <a:off x="4112260" y="2905779"/>
+            <a:ext cx="785707" cy="209974"/>
+          </a:xfrm>
+          <a:prstGeom prst="rightArrow">
+            <a:avLst/>
+          </a:prstGeom>
+        </p:spPr>
+        <p:style>
+          <a:lnRef idx="2">
+            <a:schemeClr val="accent1">
+              <a:shade val="15000"/>
+            </a:schemeClr>
+          </a:lnRef>
+          <a:fillRef idx="1">
+            <a:schemeClr val="accent1"/>
+          </a:fillRef>
+          <a:effectRef idx="0">
+            <a:schemeClr val="accent1"/>
+          </a:effectRef>
+          <a:fontRef idx="minor">
+            <a:schemeClr val="lt1"/>
+          </a:fontRef>
+        </p:style>
+        <p:txBody>
+          <a:bodyPr rtlCol="0" anchor="ctr"/>
+          <a:lstStyle/>
+          <a:p>
+            <a:pPr algn="ctr"/>
+            <a:endParaRPr lang="en-US"/>
+          </a:p>
+        </p:txBody>
+      </p:sp>
+      <p:sp>
+        <p:nvSpPr>
+          <p:cNvPr id="12" name="Arrow: Right 11">
+            <a:extLst>
+              <a:ext uri="{FF2B5EF4-FFF2-40B4-BE49-F238E27FC236}">
+                <a16:creationId xmlns:a16="http://schemas.microsoft.com/office/drawing/2014/main" id="{CC3C24A2-B256-9FE0-A406-34EF28438ED8}"/>
+              </a:ext>
+            </a:extLst>
+          </p:cNvPr>
+          <p:cNvSpPr/>
+          <p:nvPr/>
+        </p:nvSpPr>
+        <p:spPr>
+          <a:xfrm>
+            <a:off x="6546426" y="2760172"/>
+            <a:ext cx="785707" cy="209974"/>
+          </a:xfrm>
+          <a:prstGeom prst="rightArrow">
+            <a:avLst/>
+          </a:prstGeom>
+        </p:spPr>
+        <p:style>
+          <a:lnRef idx="2">
+            <a:schemeClr val="accent1">
+              <a:shade val="15000"/>
+            </a:schemeClr>
+          </a:lnRef>
+          <a:fillRef idx="1">
+            <a:schemeClr val="accent1"/>
+          </a:fillRef>
+          <a:effectRef idx="0">
+            <a:schemeClr val="accent1"/>
+          </a:effectRef>
+          <a:fontRef idx="minor">
+            <a:schemeClr val="lt1"/>
+          </a:fontRef>
+        </p:style>
+        <p:txBody>
+          <a:bodyPr rtlCol="0" anchor="ctr"/>
+          <a:lstStyle/>
+          <a:p>
+            <a:pPr algn="ctr"/>
+            <a:endParaRPr lang="en-US"/>
+          </a:p>
+        </p:txBody>
+      </p:sp>
+      <p:sp>
+        <p:nvSpPr>
+          <p:cNvPr id="19" name="Flowchart: Document 18">
+            <a:extLst>
+              <a:ext uri="{FF2B5EF4-FFF2-40B4-BE49-F238E27FC236}">
+                <a16:creationId xmlns:a16="http://schemas.microsoft.com/office/drawing/2014/main" id="{427E116D-58C8-94C2-426F-F3CC85CD4DBD}"/>
+              </a:ext>
+            </a:extLst>
+          </p:cNvPr>
+          <p:cNvSpPr/>
+          <p:nvPr/>
+        </p:nvSpPr>
+        <p:spPr>
+          <a:xfrm>
+            <a:off x="4140936" y="3169959"/>
+            <a:ext cx="364177" cy="377043"/>
+          </a:xfrm>
+          <a:prstGeom prst="flowChartDocument">
+            <a:avLst/>
+          </a:prstGeom>
+          <a:solidFill>
+            <a:schemeClr val="accent6"/>
+          </a:solidFill>
+        </p:spPr>
+        <p:style>
+          <a:lnRef idx="2">
+            <a:schemeClr val="accent1">
+              <a:shade val="50000"/>
+            </a:schemeClr>
+          </a:lnRef>
+          <a:fillRef idx="1">
+            <a:schemeClr val="accent1"/>
+          </a:fillRef>
+          <a:effectRef idx="0">
+            <a:schemeClr val="accent1"/>
+          </a:effectRef>
+          <a:fontRef idx="minor">
+            <a:schemeClr val="lt1"/>
+          </a:fontRef>
+        </p:style>
+        <p:txBody>
+          <a:bodyPr rtlCol="0" anchor="ctr"/>
+          <a:lstStyle/>
+          <a:p>
+            <a:pPr algn="ctr"/>
+            <a:endParaRPr lang="en-US" sz="1400"/>
+          </a:p>
+        </p:txBody>
+      </p:sp>
+      <p:sp>
+        <p:nvSpPr>
+          <p:cNvPr id="20" name="Flowchart: Document 19">
+            <a:extLst>
+              <a:ext uri="{FF2B5EF4-FFF2-40B4-BE49-F238E27FC236}">
+                <a16:creationId xmlns:a16="http://schemas.microsoft.com/office/drawing/2014/main" id="{2F70CCE4-157F-0F68-176B-94E0BF60E303}"/>
+              </a:ext>
+            </a:extLst>
+          </p:cNvPr>
+          <p:cNvSpPr/>
+          <p:nvPr/>
+        </p:nvSpPr>
+        <p:spPr>
+          <a:xfrm>
+            <a:off x="4255803" y="3289594"/>
+            <a:ext cx="364177" cy="377043"/>
+          </a:xfrm>
+          <a:prstGeom prst="flowChartDocument">
+            <a:avLst/>
+          </a:prstGeom>
+          <a:solidFill>
+            <a:schemeClr val="accent6"/>
+          </a:solidFill>
+        </p:spPr>
+        <p:style>
+          <a:lnRef idx="2">
+            <a:schemeClr val="accent1">
+              <a:shade val="50000"/>
+            </a:schemeClr>
+          </a:lnRef>
+          <a:fillRef idx="1">
+            <a:schemeClr val="accent1"/>
+          </a:fillRef>
+          <a:effectRef idx="0">
+            <a:schemeClr val="accent1"/>
+          </a:effectRef>
+          <a:fontRef idx="minor">
+            <a:schemeClr val="lt1"/>
+          </a:fontRef>
+        </p:style>
+        <p:txBody>
+          <a:bodyPr rtlCol="0" anchor="ctr"/>
+          <a:lstStyle/>
+          <a:p>
+            <a:pPr algn="ctr"/>
+            <a:endParaRPr lang="en-US" sz="1400"/>
+          </a:p>
+        </p:txBody>
+      </p:sp>
+      <p:sp>
+        <p:nvSpPr>
+          <p:cNvPr id="21" name="Flowchart: Document 20">
+            <a:extLst>
+              <a:ext uri="{FF2B5EF4-FFF2-40B4-BE49-F238E27FC236}">
+                <a16:creationId xmlns:a16="http://schemas.microsoft.com/office/drawing/2014/main" id="{3DE2E75C-7616-A17B-A342-5B23D5A3CD7C}"/>
+              </a:ext>
+            </a:extLst>
+          </p:cNvPr>
+          <p:cNvSpPr/>
+          <p:nvPr/>
+        </p:nvSpPr>
+        <p:spPr>
+          <a:xfrm>
+            <a:off x="4395753" y="3409229"/>
+            <a:ext cx="364177" cy="377043"/>
+          </a:xfrm>
+          <a:prstGeom prst="flowChartDocument">
+            <a:avLst/>
+          </a:prstGeom>
+          <a:solidFill>
+            <a:schemeClr val="accent6"/>
+          </a:solidFill>
+        </p:spPr>
+        <p:style>
+          <a:lnRef idx="2">
+            <a:schemeClr val="accent1">
+              <a:shade val="50000"/>
+            </a:schemeClr>
+          </a:lnRef>
+          <a:fillRef idx="1">
+            <a:schemeClr val="accent1"/>
+          </a:fillRef>
+          <a:effectRef idx="0">
+            <a:schemeClr val="accent1"/>
+          </a:effectRef>
+          <a:fontRef idx="minor">
+            <a:schemeClr val="lt1"/>
+          </a:fontRef>
+        </p:style>
+        <p:txBody>
+          <a:bodyPr rtlCol="0" anchor="ctr"/>
+          <a:lstStyle/>
+          <a:p>
+            <a:pPr algn="ctr"/>
+            <a:endParaRPr lang="en-US" sz="1400"/>
+          </a:p>
+        </p:txBody>
+      </p:sp>
+      <p:sp>
+        <p:nvSpPr>
+          <p:cNvPr id="22" name="Flowchart: Document 21">
+            <a:extLst>
+              <a:ext uri="{FF2B5EF4-FFF2-40B4-BE49-F238E27FC236}">
+                <a16:creationId xmlns:a16="http://schemas.microsoft.com/office/drawing/2014/main" id="{BBD1EFBC-A33B-0494-736C-C4377A3045B4}"/>
+              </a:ext>
+            </a:extLst>
+          </p:cNvPr>
+          <p:cNvSpPr/>
+          <p:nvPr/>
+        </p:nvSpPr>
+        <p:spPr>
+          <a:xfrm>
+            <a:off x="4526225" y="3547002"/>
+            <a:ext cx="364177" cy="377043"/>
+          </a:xfrm>
+          <a:prstGeom prst="flowChartDocument">
+            <a:avLst/>
+          </a:prstGeom>
+          <a:solidFill>
+            <a:schemeClr val="accent6"/>
+          </a:solidFill>
+        </p:spPr>
+        <p:style>
+          <a:lnRef idx="2">
+            <a:schemeClr val="accent1">
+              <a:shade val="50000"/>
+            </a:schemeClr>
+          </a:lnRef>
+          <a:fillRef idx="1">
+            <a:schemeClr val="accent1"/>
+          </a:fillRef>
+          <a:effectRef idx="0">
+            <a:schemeClr val="accent1"/>
+          </a:effectRef>
+          <a:fontRef idx="minor">
+            <a:schemeClr val="lt1"/>
+          </a:fontRef>
+        </p:style>
+        <p:txBody>
+          <a:bodyPr rtlCol="0" anchor="ctr"/>
+          <a:lstStyle/>
+          <a:p>
+            <a:pPr algn="ctr"/>
+            <a:endParaRPr lang="en-US" sz="1400"/>
+          </a:p>
+        </p:txBody>
+      </p:sp>
+      <p:sp>
+        <p:nvSpPr>
+          <p:cNvPr id="25" name="TextBox 24">
+            <a:extLst>
+              <a:ext uri="{FF2B5EF4-FFF2-40B4-BE49-F238E27FC236}">
+                <a16:creationId xmlns:a16="http://schemas.microsoft.com/office/drawing/2014/main" id="{DAC292FB-7235-8952-666F-794EFFA06A7A}"/>
+              </a:ext>
+            </a:extLst>
+          </p:cNvPr>
+          <p:cNvSpPr txBox="1"/>
+          <p:nvPr/>
+        </p:nvSpPr>
+        <p:spPr>
+          <a:xfrm>
+            <a:off x="3729286" y="3973763"/>
+            <a:ext cx="1781387" cy="430887"/>
+          </a:xfrm>
+          <a:prstGeom prst="rect">
+            <a:avLst/>
+          </a:prstGeom>
+          <a:noFill/>
+        </p:spPr>
+        <p:txBody>
+          <a:bodyPr wrap="square" rtlCol="0">
+            <a:spAutoFit/>
+          </a:bodyPr>
+          <a:lstStyle/>
+          <a:p>
+            <a:pPr algn="ctr"/>
+            <a:r>
+              <a:rPr lang="en-US" sz="1100" dirty="0"/>
+              <a:t>FHIR API queries to retrieve patient Bundles</a:t>
+            </a:r>
+          </a:p>
+        </p:txBody>
+      </p:sp>
+      <p:sp>
+        <p:nvSpPr>
+          <p:cNvPr id="26" name="TextBox 25">
+            <a:extLst>
+              <a:ext uri="{FF2B5EF4-FFF2-40B4-BE49-F238E27FC236}">
+                <a16:creationId xmlns:a16="http://schemas.microsoft.com/office/drawing/2014/main" id="{B8D512F8-2536-9659-06AE-D329A891CF4D}"/>
+              </a:ext>
+            </a:extLst>
+          </p:cNvPr>
+          <p:cNvSpPr txBox="1"/>
+          <p:nvPr/>
+        </p:nvSpPr>
+        <p:spPr>
+          <a:xfrm>
+            <a:off x="6047739" y="3973763"/>
+            <a:ext cx="1781387" cy="430887"/>
+          </a:xfrm>
+          <a:prstGeom prst="rect">
+            <a:avLst/>
+          </a:prstGeom>
+          <a:noFill/>
+        </p:spPr>
+        <p:txBody>
+          <a:bodyPr wrap="square" rtlCol="0">
+            <a:spAutoFit/>
+          </a:bodyPr>
+          <a:lstStyle/>
+          <a:p>
+            <a:pPr algn="ctr"/>
+            <a:r>
+              <a:rPr lang="en-US" sz="1100" dirty="0"/>
+              <a:t>POST patient Bundles with calculated </a:t>
+            </a:r>
+            <a:r>
+              <a:rPr lang="en-US" sz="1100" dirty="0" err="1"/>
+              <a:t>MeasureReport</a:t>
+            </a:r>
+            <a:endParaRPr lang="en-US" sz="1100" dirty="0"/>
+          </a:p>
+        </p:txBody>
+      </p:sp>
+      <p:sp>
+        <p:nvSpPr>
+          <p:cNvPr id="3" name="Flowchart: Document 2">
+            <a:extLst>
+              <a:ext uri="{FF2B5EF4-FFF2-40B4-BE49-F238E27FC236}">
+                <a16:creationId xmlns:a16="http://schemas.microsoft.com/office/drawing/2014/main" id="{43CF29F3-E363-78FA-2A22-3E0B6A3C9736}"/>
+              </a:ext>
+            </a:extLst>
+          </p:cNvPr>
+          <p:cNvSpPr/>
+          <p:nvPr/>
+        </p:nvSpPr>
+        <p:spPr>
+          <a:xfrm>
+            <a:off x="6574257" y="3169959"/>
+            <a:ext cx="364177" cy="377043"/>
+          </a:xfrm>
+          <a:prstGeom prst="flowChartDocument">
+            <a:avLst/>
+          </a:prstGeom>
+          <a:solidFill>
+            <a:schemeClr val="accent6"/>
+          </a:solidFill>
+        </p:spPr>
+        <p:style>
+          <a:lnRef idx="2">
+            <a:schemeClr val="accent1">
+              <a:shade val="50000"/>
+            </a:schemeClr>
+          </a:lnRef>
+          <a:fillRef idx="1">
+            <a:schemeClr val="accent1"/>
+          </a:fillRef>
+          <a:effectRef idx="0">
+            <a:schemeClr val="accent1"/>
+          </a:effectRef>
+          <a:fontRef idx="minor">
+            <a:schemeClr val="lt1"/>
+          </a:fontRef>
+        </p:style>
+        <p:txBody>
+          <a:bodyPr rtlCol="0" anchor="ctr"/>
+          <a:lstStyle/>
+          <a:p>
+            <a:pPr algn="ctr"/>
+            <a:endParaRPr lang="en-US" sz="1400"/>
+          </a:p>
+        </p:txBody>
+      </p:sp>
+      <p:sp>
+        <p:nvSpPr>
+          <p:cNvPr id="5" name="Flowchart: Document 4">
+            <a:extLst>
+              <a:ext uri="{FF2B5EF4-FFF2-40B4-BE49-F238E27FC236}">
+                <a16:creationId xmlns:a16="http://schemas.microsoft.com/office/drawing/2014/main" id="{4341624B-6EC2-CFC5-DF6A-B1E9D858BAFF}"/>
+              </a:ext>
+            </a:extLst>
+          </p:cNvPr>
+          <p:cNvSpPr/>
+          <p:nvPr/>
+        </p:nvSpPr>
+        <p:spPr>
+          <a:xfrm>
+            <a:off x="6689124" y="3289594"/>
+            <a:ext cx="364177" cy="377043"/>
+          </a:xfrm>
+          <a:prstGeom prst="flowChartDocument">
+            <a:avLst/>
+          </a:prstGeom>
+          <a:solidFill>
+            <a:schemeClr val="accent6"/>
+          </a:solidFill>
+        </p:spPr>
+        <p:style>
+          <a:lnRef idx="2">
+            <a:schemeClr val="accent1">
+              <a:shade val="50000"/>
+            </a:schemeClr>
+          </a:lnRef>
+          <a:fillRef idx="1">
+            <a:schemeClr val="accent1"/>
+          </a:fillRef>
+          <a:effectRef idx="0">
+            <a:schemeClr val="accent1"/>
+          </a:effectRef>
+          <a:fontRef idx="minor">
+            <a:schemeClr val="lt1"/>
+          </a:fontRef>
+        </p:style>
+        <p:txBody>
+          <a:bodyPr rtlCol="0" anchor="ctr"/>
+          <a:lstStyle/>
+          <a:p>
+            <a:pPr algn="ctr"/>
+            <a:endParaRPr lang="en-US" sz="1400"/>
+          </a:p>
+        </p:txBody>
+      </p:sp>
+      <p:sp>
+        <p:nvSpPr>
+          <p:cNvPr id="8" name="Flowchart: Document 7">
+            <a:extLst>
+              <a:ext uri="{FF2B5EF4-FFF2-40B4-BE49-F238E27FC236}">
+                <a16:creationId xmlns:a16="http://schemas.microsoft.com/office/drawing/2014/main" id="{FF45BCDC-B507-A386-CEE8-23585B1EB683}"/>
+              </a:ext>
+            </a:extLst>
+          </p:cNvPr>
+          <p:cNvSpPr/>
+          <p:nvPr/>
+        </p:nvSpPr>
+        <p:spPr>
+          <a:xfrm>
+            <a:off x="6829074" y="3409229"/>
+            <a:ext cx="364177" cy="377043"/>
+          </a:xfrm>
+          <a:prstGeom prst="flowChartDocument">
+            <a:avLst/>
+          </a:prstGeom>
+          <a:solidFill>
+            <a:schemeClr val="accent6"/>
+          </a:solidFill>
+        </p:spPr>
+        <p:style>
+          <a:lnRef idx="2">
+            <a:schemeClr val="accent1">
+              <a:shade val="50000"/>
+            </a:schemeClr>
+          </a:lnRef>
+          <a:fillRef idx="1">
+            <a:schemeClr val="accent1"/>
+          </a:fillRef>
+          <a:effectRef idx="0">
+            <a:schemeClr val="accent1"/>
+          </a:effectRef>
+          <a:fontRef idx="minor">
+            <a:schemeClr val="lt1"/>
+          </a:fontRef>
+        </p:style>
+        <p:txBody>
+          <a:bodyPr rtlCol="0" anchor="ctr"/>
+          <a:lstStyle/>
+          <a:p>
+            <a:pPr algn="ctr"/>
+            <a:endParaRPr lang="en-US" sz="1400"/>
+          </a:p>
+        </p:txBody>
+      </p:sp>
+      <p:sp>
+        <p:nvSpPr>
+          <p:cNvPr id="9" name="Flowchart: Document 8">
+            <a:extLst>
+              <a:ext uri="{FF2B5EF4-FFF2-40B4-BE49-F238E27FC236}">
+                <a16:creationId xmlns:a16="http://schemas.microsoft.com/office/drawing/2014/main" id="{85C0A25A-8AB4-4001-671E-6CAF645DAFC4}"/>
+              </a:ext>
+            </a:extLst>
+          </p:cNvPr>
+          <p:cNvSpPr/>
+          <p:nvPr/>
+        </p:nvSpPr>
+        <p:spPr>
+          <a:xfrm>
+            <a:off x="6959546" y="3547002"/>
+            <a:ext cx="364177" cy="377043"/>
+          </a:xfrm>
+          <a:prstGeom prst="flowChartDocument">
+            <a:avLst/>
+          </a:prstGeom>
+          <a:solidFill>
+            <a:schemeClr val="accent6"/>
+          </a:solidFill>
+        </p:spPr>
+        <p:style>
+          <a:lnRef idx="2">
+            <a:schemeClr val="accent1">
+              <a:shade val="50000"/>
+            </a:schemeClr>
+          </a:lnRef>
+          <a:fillRef idx="1">
+            <a:schemeClr val="accent1"/>
+          </a:fillRef>
+          <a:effectRef idx="0">
+            <a:schemeClr val="accent1"/>
+          </a:effectRef>
+          <a:fontRef idx="minor">
+            <a:schemeClr val="lt1"/>
+          </a:fontRef>
+        </p:style>
+        <p:txBody>
+          <a:bodyPr rtlCol="0" anchor="ctr"/>
+          <a:lstStyle/>
+          <a:p>
+            <a:pPr algn="ctr"/>
+            <a:endParaRPr lang="en-US" sz="1400"/>
+          </a:p>
+        </p:txBody>
+      </p:sp>
+    </p:spTree>
+    <p:extLst>
+      <p:ext uri="{BB962C8B-B14F-4D97-AF65-F5344CB8AC3E}">
+        <p14:creationId xmlns:p14="http://schemas.microsoft.com/office/powerpoint/2010/main" val="826301999"/>
       </p:ext>
     </p:extLst>
   </p:cSld>

</xml_diff>